<commit_message>
More on meta, sfinae and some conspected code from runtime polymorphism talk
git-svn-id: https://svn.code.sf.net/p/cpp-lects-rus/code/trunk@240 39143b06-f351-456c-9f92-4cd32fad6823
</commit_message>
<xml_diff>
--- a/slides/sep2017/09-constexpr.pptx
+++ b/slides/sep2017/09-constexpr.pptx
@@ -312,7 +312,7 @@
             <a:fld id="{96DFF08F-DC6B-4601-B491-B0F83F6DD2DA}" type="datetimeFigureOut">
               <a:rPr lang="en-US" dirty="0"/>
               <a:pPr/>
-              <a:t>11/17/2017</a:t>
+              <a:t>11/26/2017</a:t>
             </a:fld>
             <a:endParaRPr lang="en-US" dirty="0"/>
           </a:p>
@@ -529,7 +529,7 @@
           <a:p>
             <a:fld id="{96DFF08F-DC6B-4601-B491-B0F83F6DD2DA}" type="datetimeFigureOut">
               <a:rPr lang="en-US" dirty="0"/>
-              <a:t>11/17/2017</a:t>
+              <a:t>11/26/2017</a:t>
             </a:fld>
             <a:endParaRPr lang="en-US" dirty="0"/>
           </a:p>
@@ -704,7 +704,7 @@
           <a:p>
             <a:fld id="{96DFF08F-DC6B-4601-B491-B0F83F6DD2DA}" type="datetimeFigureOut">
               <a:rPr lang="en-US" dirty="0"/>
-              <a:t>11/17/2017</a:t>
+              <a:t>11/26/2017</a:t>
             </a:fld>
             <a:endParaRPr lang="en-US" dirty="0"/>
           </a:p>
@@ -869,7 +869,7 @@
           <a:p>
             <a:fld id="{96DFF08F-DC6B-4601-B491-B0F83F6DD2DA}" type="datetimeFigureOut">
               <a:rPr lang="en-US" dirty="0"/>
-              <a:t>11/17/2017</a:t>
+              <a:t>11/26/2017</a:t>
             </a:fld>
             <a:endParaRPr lang="en-US" dirty="0"/>
           </a:p>
@@ -1115,7 +1115,7 @@
           <a:p>
             <a:fld id="{96DFF08F-DC6B-4601-B491-B0F83F6DD2DA}" type="datetimeFigureOut">
               <a:rPr lang="en-US" dirty="0"/>
-              <a:t>11/17/2017</a:t>
+              <a:t>11/26/2017</a:t>
             </a:fld>
             <a:endParaRPr lang="en-US" dirty="0"/>
           </a:p>
@@ -1433,7 +1433,7 @@
           <a:p>
             <a:fld id="{96DFF08F-DC6B-4601-B491-B0F83F6DD2DA}" type="datetimeFigureOut">
               <a:rPr lang="en-US" dirty="0"/>
-              <a:t>11/17/2017</a:t>
+              <a:t>11/26/2017</a:t>
             </a:fld>
             <a:endParaRPr lang="en-US" dirty="0"/>
           </a:p>
@@ -1852,7 +1852,7 @@
           <a:p>
             <a:fld id="{96DFF08F-DC6B-4601-B491-B0F83F6DD2DA}" type="datetimeFigureOut">
               <a:rPr lang="en-US" dirty="0"/>
-              <a:t>11/17/2017</a:t>
+              <a:t>11/26/2017</a:t>
             </a:fld>
             <a:endParaRPr lang="en-US" dirty="0"/>
           </a:p>
@@ -1965,7 +1965,7 @@
           <a:p>
             <a:fld id="{96DFF08F-DC6B-4601-B491-B0F83F6DD2DA}" type="datetimeFigureOut">
               <a:rPr lang="en-US" dirty="0"/>
-              <a:t>11/17/2017</a:t>
+              <a:t>11/26/2017</a:t>
             </a:fld>
             <a:endParaRPr lang="en-US" dirty="0"/>
           </a:p>
@@ -2055,7 +2055,7 @@
           <a:p>
             <a:fld id="{96DFF08F-DC6B-4601-B491-B0F83F6DD2DA}" type="datetimeFigureOut">
               <a:rPr lang="en-US" dirty="0"/>
-              <a:t>11/17/2017</a:t>
+              <a:t>11/26/2017</a:t>
             </a:fld>
             <a:endParaRPr lang="en-US" dirty="0"/>
           </a:p>
@@ -2340,7 +2340,7 @@
           <a:p>
             <a:fld id="{96DFF08F-DC6B-4601-B491-B0F83F6DD2DA}" type="datetimeFigureOut">
               <a:rPr lang="en-US" dirty="0"/>
-              <a:t>11/17/2017</a:t>
+              <a:t>11/26/2017</a:t>
             </a:fld>
             <a:endParaRPr lang="en-US" dirty="0"/>
           </a:p>
@@ -2607,7 +2607,7 @@
           <a:p>
             <a:fld id="{96DFF08F-DC6B-4601-B491-B0F83F6DD2DA}" type="datetimeFigureOut">
               <a:rPr lang="en-US" dirty="0"/>
-              <a:t>11/17/2017</a:t>
+              <a:t>11/26/2017</a:t>
             </a:fld>
             <a:endParaRPr lang="en-US" dirty="0"/>
           </a:p>
@@ -2856,7 +2856,7 @@
             <a:fld id="{96DFF08F-DC6B-4601-B491-B0F83F6DD2DA}" type="datetimeFigureOut">
               <a:rPr lang="en-US" dirty="0"/>
               <a:pPr/>
-              <a:t>11/17/2017</a:t>
+              <a:t>11/26/2017</a:t>
             </a:fld>
             <a:endParaRPr lang="en-US" dirty="0"/>
           </a:p>
@@ -3690,13 +3690,8 @@
             </a:pPr>
             <a:r>
               <a:rPr lang="ru-RU" sz="4800" smtClean="0"/>
-              <a:t> </a:t>
-            </a:r>
-            <a:r>
-              <a:rPr lang="ru-RU" sz="4800" smtClean="0"/>
-              <a:t>Константность</a:t>
-            </a:r>
-            <a:endParaRPr lang="ru-RU" sz="4800" smtClean="0"/>
+              <a:t> Константность</a:t>
+            </a:r>
           </a:p>
           <a:p>
             <a:pPr>
@@ -3708,13 +3703,8 @@
             </a:pPr>
             <a:r>
               <a:rPr lang="ru-RU" sz="4800" smtClean="0"/>
-              <a:t> </a:t>
-            </a:r>
-            <a:r>
-              <a:rPr lang="ru-RU" sz="4800" smtClean="0"/>
-              <a:t>Функции времени компиляции</a:t>
-            </a:r>
-            <a:endParaRPr lang="ru-RU" sz="4800" smtClean="0"/>
+              <a:t> Функции времени компиляции</a:t>
+            </a:r>
           </a:p>
           <a:p>
             <a:pPr>
@@ -3726,11 +3716,7 @@
             </a:pPr>
             <a:r>
               <a:rPr lang="ru-RU" sz="4800" smtClean="0"/>
-              <a:t> </a:t>
-            </a:r>
-            <a:r>
-              <a:rPr lang="ru-RU" sz="4800" smtClean="0"/>
-              <a:t>ООП времени компиляции</a:t>
+              <a:t> ООП времени компиляции</a:t>
             </a:r>
             <a:endParaRPr lang="en-US" sz="4800" smtClean="0"/>
           </a:p>
@@ -3750,7 +3736,6 @@
               <a:rPr lang="ru-RU" sz="4800" smtClean="0"/>
               <a:t>Пользовательские суффиксы</a:t>
             </a:r>
-            <a:endParaRPr lang="ru-RU" sz="4800" smtClean="0"/>
           </a:p>
         </p:txBody>
       </p:sp>
@@ -3799,6 +3784,10 @@
           <a:bodyPr/>
           <a:lstStyle/>
           <a:p>
+            <a:r>
+              <a:rPr lang="ru-RU" smtClean="0"/>
+              <a:t>Константность?</a:t>
+            </a:r>
             <a:endParaRPr lang="en-US"/>
           </a:p>
         </p:txBody>

</xml_diff>

<commit_message>
Code and slides on exceptions
git-svn-id: https://svn.code.sf.net/p/cpp-lects-rus/code/trunk@246 39143b06-f351-456c-9f92-4cd32fad6823
</commit_message>
<xml_diff>
--- a/slides/sep2017/09-constexpr.pptx
+++ b/slides/sep2017/09-constexpr.pptx
@@ -396,7 +396,7 @@
             <a:fld id="{96DFF08F-DC6B-4601-B491-B0F83F6DD2DA}" type="datetimeFigureOut">
               <a:rPr lang="en-US" dirty="0"/>
               <a:pPr/>
-              <a:t>12/11/2017</a:t>
+              <a:t>12/15/2017</a:t>
             </a:fld>
             <a:endParaRPr lang="en-US" dirty="0"/>
           </a:p>
@@ -613,7 +613,7 @@
           <a:p>
             <a:fld id="{96DFF08F-DC6B-4601-B491-B0F83F6DD2DA}" type="datetimeFigureOut">
               <a:rPr lang="en-US" dirty="0"/>
-              <a:t>12/11/2017</a:t>
+              <a:t>12/15/2017</a:t>
             </a:fld>
             <a:endParaRPr lang="en-US" dirty="0"/>
           </a:p>
@@ -788,7 +788,7 @@
           <a:p>
             <a:fld id="{96DFF08F-DC6B-4601-B491-B0F83F6DD2DA}" type="datetimeFigureOut">
               <a:rPr lang="en-US" dirty="0"/>
-              <a:t>12/11/2017</a:t>
+              <a:t>12/15/2017</a:t>
             </a:fld>
             <a:endParaRPr lang="en-US" dirty="0"/>
           </a:p>
@@ -953,7 +953,7 @@
           <a:p>
             <a:fld id="{96DFF08F-DC6B-4601-B491-B0F83F6DD2DA}" type="datetimeFigureOut">
               <a:rPr lang="en-US" dirty="0"/>
-              <a:t>12/11/2017</a:t>
+              <a:t>12/15/2017</a:t>
             </a:fld>
             <a:endParaRPr lang="en-US" dirty="0"/>
           </a:p>
@@ -1199,7 +1199,7 @@
           <a:p>
             <a:fld id="{96DFF08F-DC6B-4601-B491-B0F83F6DD2DA}" type="datetimeFigureOut">
               <a:rPr lang="en-US" dirty="0"/>
-              <a:t>12/11/2017</a:t>
+              <a:t>12/15/2017</a:t>
             </a:fld>
             <a:endParaRPr lang="en-US" dirty="0"/>
           </a:p>
@@ -1517,7 +1517,7 @@
           <a:p>
             <a:fld id="{96DFF08F-DC6B-4601-B491-B0F83F6DD2DA}" type="datetimeFigureOut">
               <a:rPr lang="en-US" dirty="0"/>
-              <a:t>12/11/2017</a:t>
+              <a:t>12/15/2017</a:t>
             </a:fld>
             <a:endParaRPr lang="en-US" dirty="0"/>
           </a:p>
@@ -1936,7 +1936,7 @@
           <a:p>
             <a:fld id="{96DFF08F-DC6B-4601-B491-B0F83F6DD2DA}" type="datetimeFigureOut">
               <a:rPr lang="en-US" dirty="0"/>
-              <a:t>12/11/2017</a:t>
+              <a:t>12/15/2017</a:t>
             </a:fld>
             <a:endParaRPr lang="en-US" dirty="0"/>
           </a:p>
@@ -2049,7 +2049,7 @@
           <a:p>
             <a:fld id="{96DFF08F-DC6B-4601-B491-B0F83F6DD2DA}" type="datetimeFigureOut">
               <a:rPr lang="en-US" dirty="0"/>
-              <a:t>12/11/2017</a:t>
+              <a:t>12/15/2017</a:t>
             </a:fld>
             <a:endParaRPr lang="en-US" dirty="0"/>
           </a:p>
@@ -2139,7 +2139,7 @@
           <a:p>
             <a:fld id="{96DFF08F-DC6B-4601-B491-B0F83F6DD2DA}" type="datetimeFigureOut">
               <a:rPr lang="en-US" dirty="0"/>
-              <a:t>12/11/2017</a:t>
+              <a:t>12/15/2017</a:t>
             </a:fld>
             <a:endParaRPr lang="en-US" dirty="0"/>
           </a:p>
@@ -2424,7 +2424,7 @@
           <a:p>
             <a:fld id="{96DFF08F-DC6B-4601-B491-B0F83F6DD2DA}" type="datetimeFigureOut">
               <a:rPr lang="en-US" dirty="0"/>
-              <a:t>12/11/2017</a:t>
+              <a:t>12/15/2017</a:t>
             </a:fld>
             <a:endParaRPr lang="en-US" dirty="0"/>
           </a:p>
@@ -2691,7 +2691,7 @@
           <a:p>
             <a:fld id="{96DFF08F-DC6B-4601-B491-B0F83F6DD2DA}" type="datetimeFigureOut">
               <a:rPr lang="en-US" dirty="0"/>
-              <a:t>12/11/2017</a:t>
+              <a:t>12/15/2017</a:t>
             </a:fld>
             <a:endParaRPr lang="en-US" dirty="0"/>
           </a:p>
@@ -2940,7 +2940,7 @@
             <a:fld id="{96DFF08F-DC6B-4601-B491-B0F83F6DD2DA}" type="datetimeFigureOut">
               <a:rPr lang="en-US" dirty="0"/>
               <a:pPr/>
-              <a:t>12/11/2017</a:t>
+              <a:t>12/15/2017</a:t>
             </a:fld>
             <a:endParaRPr lang="en-US" dirty="0"/>
           </a:p>
@@ -11224,24 +11224,24 @@
               <a:rPr lang="en-US" smtClean="0">
                 <a:latin typeface="Consolas" panose="020B0609020204030204" pitchFamily="49" charset="0"/>
               </a:rPr>
-              <a:t>seven </a:t>
-            </a:r>
-            <a:r>
-              <a:rPr lang="en-US">
-                <a:latin typeface="Consolas" panose="020B0609020204030204" pitchFamily="49" charset="0"/>
-              </a:rPr>
-              <a:t>= arr[3] + arr[4];</a:t>
-            </a:r>
-            <a:br>
-              <a:rPr lang="en-US">
-                <a:latin typeface="Consolas" panose="020B0609020204030204" pitchFamily="49" charset="0"/>
-              </a:rPr>
-            </a:br>
-            <a:r>
-              <a:rPr lang="en-US" smtClean="0">
-                <a:latin typeface="Consolas" panose="020B0609020204030204" pitchFamily="49" charset="0"/>
-              </a:rPr>
-              <a:t>static_assert (seven == 7); </a:t>
+              <a:t>four = </a:t>
+            </a:r>
+            <a:r>
+              <a:rPr lang="en-US">
+                <a:latin typeface="Consolas" panose="020B0609020204030204" pitchFamily="49" charset="0"/>
+              </a:rPr>
+              <a:t>arr[3] + arr[4];</a:t>
+            </a:r>
+            <a:br>
+              <a:rPr lang="en-US">
+                <a:latin typeface="Consolas" panose="020B0609020204030204" pitchFamily="49" charset="0"/>
+              </a:rPr>
+            </a:br>
+            <a:r>
+              <a:rPr lang="en-US" smtClean="0">
+                <a:latin typeface="Consolas" panose="020B0609020204030204" pitchFamily="49" charset="0"/>
+              </a:rPr>
+              <a:t>static_assert (four == 4); </a:t>
             </a:r>
             <a:r>
               <a:rPr lang="en-US">
@@ -18116,13 +18116,7 @@
               <a:rPr lang="en-US">
                 <a:latin typeface="Consolas" panose="020B0609020204030204" pitchFamily="49" charset="0"/>
               </a:rPr>
-              <a:t>auto test = make_tuple(1, 1.5, 2, 2.5, 3, </a:t>
-            </a:r>
-            <a:r>
-              <a:rPr lang="en-US">
-                <a:latin typeface="Consolas" panose="020B0609020204030204" pitchFamily="49" charset="0"/>
-              </a:rPr>
-              <a:t>3.5</a:t>
+              <a:t>auto test = make_tuple(1, 1.5, 2, 2.5, 3, 3.5</a:t>
             </a:r>
             <a:r>
               <a:rPr lang="en-US" smtClean="0">
@@ -18166,13 +18160,7 @@
               <a:rPr lang="en-US">
                 <a:latin typeface="Consolas" panose="020B0609020204030204" pitchFamily="49" charset="0"/>
               </a:rPr>
-              <a:t>= permute_elts&lt;2, 3, 1, 4, 0&gt;(test</a:t>
-            </a:r>
-            <a:r>
-              <a:rPr lang="en-US">
-                <a:latin typeface="Consolas" panose="020B0609020204030204" pitchFamily="49" charset="0"/>
-              </a:rPr>
-              <a:t>);  </a:t>
+              <a:t>= permute_elts&lt;2, 3, 1, 4, 0&gt;(test);  </a:t>
             </a:r>
             <a:endParaRPr lang="en-US" smtClean="0">
               <a:latin typeface="Consolas" panose="020B0609020204030204" pitchFamily="49" charset="0"/>
@@ -18198,13 +18186,7 @@
               <a:rPr lang="en-US">
                 <a:latin typeface="Consolas" panose="020B0609020204030204" pitchFamily="49" charset="0"/>
               </a:rPr>
-              <a:t>, 2.5, 1, 2, 1.5</a:t>
-            </a:r>
-            <a:r>
-              <a:rPr lang="en-US">
-                <a:latin typeface="Consolas" panose="020B0609020204030204" pitchFamily="49" charset="0"/>
-              </a:rPr>
-              <a:t>, </a:t>
+              <a:t>, 2.5, 1, 2, 1.5, </a:t>
             </a:r>
             <a:r>
               <a:rPr lang="en-US" smtClean="0">
@@ -18482,48 +18464,36 @@
               <a:rPr lang="en-US" sz="2000">
                 <a:latin typeface="Consolas" panose="020B0609020204030204" pitchFamily="49" charset="0"/>
               </a:rPr>
-              <a:t>template&lt;typename Tuple, size_t... </a:t>
+              <a:t>template&lt;typename Tuple, size_t... Is</a:t>
+            </a:r>
+            <a:r>
+              <a:rPr lang="en-US" sz="2000" smtClean="0">
+                <a:latin typeface="Consolas" panose="020B0609020204030204" pitchFamily="49" charset="0"/>
+              </a:rPr>
+              <a:t>&gt;</a:t>
+            </a:r>
+            <a:r>
+              <a:rPr lang="ru-RU" sz="2000" smtClean="0">
+                <a:latin typeface="Consolas" panose="020B0609020204030204" pitchFamily="49" charset="0"/>
+              </a:rPr>
+              <a:t/>
+            </a:r>
+            <a:br>
+              <a:rPr lang="ru-RU" sz="2000" smtClean="0">
+                <a:latin typeface="Consolas" panose="020B0609020204030204" pitchFamily="49" charset="0"/>
+              </a:rPr>
+            </a:br>
+            <a:r>
+              <a:rPr lang="en-US" sz="2000" smtClean="0">
+                <a:latin typeface="Consolas" panose="020B0609020204030204" pitchFamily="49" charset="0"/>
+              </a:rPr>
+              <a:t>void </a:t>
             </a:r>
             <a:r>
               <a:rPr lang="en-US" sz="2000">
                 <a:latin typeface="Consolas" panose="020B0609020204030204" pitchFamily="49" charset="0"/>
               </a:rPr>
-              <a:t>Is</a:t>
-            </a:r>
-            <a:r>
-              <a:rPr lang="en-US" sz="2000" smtClean="0">
-                <a:latin typeface="Consolas" panose="020B0609020204030204" pitchFamily="49" charset="0"/>
-              </a:rPr>
-              <a:t>&gt;</a:t>
-            </a:r>
-            <a:r>
-              <a:rPr lang="ru-RU" sz="2000" smtClean="0">
-                <a:latin typeface="Consolas" panose="020B0609020204030204" pitchFamily="49" charset="0"/>
-              </a:rPr>
-              <a:t/>
-            </a:r>
-            <a:br>
-              <a:rPr lang="ru-RU" sz="2000" smtClean="0">
-                <a:latin typeface="Consolas" panose="020B0609020204030204" pitchFamily="49" charset="0"/>
-              </a:rPr>
-            </a:br>
-            <a:r>
-              <a:rPr lang="en-US" sz="2000" smtClean="0">
-                <a:latin typeface="Consolas" panose="020B0609020204030204" pitchFamily="49" charset="0"/>
-              </a:rPr>
-              <a:t>void </a:t>
-            </a:r>
-            <a:r>
-              <a:rPr lang="en-US" sz="2000">
-                <a:latin typeface="Consolas" panose="020B0609020204030204" pitchFamily="49" charset="0"/>
-              </a:rPr>
-              <a:t>print_tuple_impl(ostream&amp; os, Tuple &amp;&amp;t, </a:t>
-            </a:r>
-            <a:r>
-              <a:rPr lang="en-US" sz="2000">
-                <a:latin typeface="Consolas" panose="020B0609020204030204" pitchFamily="49" charset="0"/>
-              </a:rPr>
-              <a:t>index_sequence&lt;Is</a:t>
+              <a:t>print_tuple_impl(ostream&amp; os, Tuple &amp;&amp;t, index_sequence&lt;Is</a:t>
             </a:r>
             <a:r>
               <a:rPr lang="en-US" sz="2000" smtClean="0">
@@ -18573,7 +18543,34 @@
                 </a:solidFill>
                 <a:latin typeface="Consolas" panose="020B0609020204030204" pitchFamily="49" charset="0"/>
               </a:rPr>
-              <a:t>(os &lt;&lt; (Is == 0 ? "" : </a:t>
+              <a:t>(os &lt;&lt; (Is == 0 ? "" : ", </a:t>
+            </a:r>
+            <a:r>
+              <a:rPr lang="en-US" sz="2000" smtClean="0">
+                <a:solidFill>
+                  <a:srgbClr val="0000FF"/>
+                </a:solidFill>
+                <a:latin typeface="Consolas" panose="020B0609020204030204" pitchFamily="49" charset="0"/>
+              </a:rPr>
+              <a:t>")</a:t>
+            </a:r>
+            <a:r>
+              <a:rPr lang="ru-RU" sz="2000" smtClean="0">
+                <a:solidFill>
+                  <a:srgbClr val="0000FF"/>
+                </a:solidFill>
+                <a:latin typeface="Consolas" panose="020B0609020204030204" pitchFamily="49" charset="0"/>
+              </a:rPr>
+              <a:t> </a:t>
+            </a:r>
+            <a:r>
+              <a:rPr lang="en-US" sz="2000" smtClean="0">
+                <a:solidFill>
+                  <a:srgbClr val="0000FF"/>
+                </a:solidFill>
+                <a:latin typeface="Consolas" panose="020B0609020204030204" pitchFamily="49" charset="0"/>
+              </a:rPr>
+              <a:t>&lt;&lt; </a:t>
             </a:r>
             <a:r>
               <a:rPr lang="en-US" sz="2000">
@@ -18582,7 +18579,169 @@
                 </a:solidFill>
                 <a:latin typeface="Consolas" panose="020B0609020204030204" pitchFamily="49" charset="0"/>
               </a:rPr>
-              <a:t>", </a:t>
+              <a:t>get&lt;Is&gt;(forward&lt;Tuple&gt;(t)))</a:t>
+            </a:r>
+            <a:r>
+              <a:rPr lang="en-US" sz="2000">
+                <a:latin typeface="Consolas" panose="020B0609020204030204" pitchFamily="49" charset="0"/>
+              </a:rPr>
+              <a:t>, </a:t>
+            </a:r>
+            <a:r>
+              <a:rPr lang="en-US" sz="2000" smtClean="0">
+                <a:latin typeface="Consolas" panose="020B0609020204030204" pitchFamily="49" charset="0"/>
+              </a:rPr>
+              <a:t>...);</a:t>
+            </a:r>
+            <a:r>
+              <a:rPr lang="ru-RU" sz="2000" smtClean="0">
+                <a:latin typeface="Consolas" panose="020B0609020204030204" pitchFamily="49" charset="0"/>
+              </a:rPr>
+              <a:t/>
+            </a:r>
+            <a:br>
+              <a:rPr lang="ru-RU" sz="2000" smtClean="0">
+                <a:latin typeface="Consolas" panose="020B0609020204030204" pitchFamily="49" charset="0"/>
+              </a:rPr>
+            </a:br>
+            <a:r>
+              <a:rPr lang="en-US" sz="2000" smtClean="0">
+                <a:latin typeface="Consolas" panose="020B0609020204030204" pitchFamily="49" charset="0"/>
+              </a:rPr>
+              <a:t>}</a:t>
+            </a:r>
+            <a:endParaRPr lang="ru-RU" sz="2000" smtClean="0">
+              <a:latin typeface="Consolas" panose="020B0609020204030204" pitchFamily="49" charset="0"/>
+            </a:endParaRPr>
+          </a:p>
+          <a:p>
+            <a:pPr marL="45720" indent="0">
+              <a:buNone/>
+            </a:pPr>
+            <a:r>
+              <a:rPr lang="en-US" sz="2000" smtClean="0">
+                <a:latin typeface="Consolas" panose="020B0609020204030204" pitchFamily="49" charset="0"/>
+              </a:rPr>
+              <a:t>template&lt;typename Tuple&gt;</a:t>
+            </a:r>
+            <a:r>
+              <a:rPr lang="ru-RU" sz="2000" smtClean="0">
+                <a:latin typeface="Consolas" panose="020B0609020204030204" pitchFamily="49" charset="0"/>
+              </a:rPr>
+              <a:t/>
+            </a:r>
+            <a:br>
+              <a:rPr lang="ru-RU" sz="2000" smtClean="0">
+                <a:latin typeface="Consolas" panose="020B0609020204030204" pitchFamily="49" charset="0"/>
+              </a:rPr>
+            </a:br>
+            <a:r>
+              <a:rPr lang="en-US" sz="2000" smtClean="0">
+                <a:latin typeface="Consolas" panose="020B0609020204030204" pitchFamily="49" charset="0"/>
+              </a:rPr>
+              <a:t>decltype(auto</a:t>
+            </a:r>
+            <a:r>
+              <a:rPr lang="en-US" sz="2000">
+                <a:latin typeface="Consolas" panose="020B0609020204030204" pitchFamily="49" charset="0"/>
+              </a:rPr>
+              <a:t>) operator&lt;&lt;(ostream&amp; os, Tuple &amp;&amp;t</a:t>
+            </a:r>
+            <a:r>
+              <a:rPr lang="en-US" sz="2000" smtClean="0">
+                <a:latin typeface="Consolas" panose="020B0609020204030204" pitchFamily="49" charset="0"/>
+              </a:rPr>
+              <a:t>){</a:t>
+            </a:r>
+            <a:r>
+              <a:rPr lang="ru-RU" sz="2000" smtClean="0">
+                <a:latin typeface="Consolas" panose="020B0609020204030204" pitchFamily="49" charset="0"/>
+              </a:rPr>
+              <a:t/>
+            </a:r>
+            <a:br>
+              <a:rPr lang="ru-RU" sz="2000" smtClean="0">
+                <a:latin typeface="Consolas" panose="020B0609020204030204" pitchFamily="49" charset="0"/>
+              </a:rPr>
+            </a:br>
+            <a:r>
+              <a:rPr lang="en-US" sz="2000" smtClean="0">
+                <a:latin typeface="Consolas" panose="020B0609020204030204" pitchFamily="49" charset="0"/>
+              </a:rPr>
+              <a:t>  </a:t>
+            </a:r>
+            <a:r>
+              <a:rPr lang="en-US" sz="2000">
+                <a:latin typeface="Consolas" panose="020B0609020204030204" pitchFamily="49" charset="0"/>
+              </a:rPr>
+              <a:t>constexpr size_t sz = tuple_size&lt;decay_t&lt;Tuple&gt;&gt;::value</a:t>
+            </a:r>
+            <a:r>
+              <a:rPr lang="en-US" sz="2000" smtClean="0">
+                <a:latin typeface="Consolas" panose="020B0609020204030204" pitchFamily="49" charset="0"/>
+              </a:rPr>
+              <a:t>;</a:t>
+            </a:r>
+            <a:r>
+              <a:rPr lang="ru-RU" sz="2000" smtClean="0">
+                <a:latin typeface="Consolas" panose="020B0609020204030204" pitchFamily="49" charset="0"/>
+              </a:rPr>
+              <a:t/>
+            </a:r>
+            <a:br>
+              <a:rPr lang="ru-RU" sz="2000" smtClean="0">
+                <a:latin typeface="Consolas" panose="020B0609020204030204" pitchFamily="49" charset="0"/>
+              </a:rPr>
+            </a:br>
+            <a:r>
+              <a:rPr lang="en-US" sz="2000" smtClean="0">
+                <a:latin typeface="Consolas" panose="020B0609020204030204" pitchFamily="49" charset="0"/>
+              </a:rPr>
+              <a:t>  </a:t>
+            </a:r>
+            <a:r>
+              <a:rPr lang="en-US" sz="2000">
+                <a:latin typeface="Consolas" panose="020B0609020204030204" pitchFamily="49" charset="0"/>
+              </a:rPr>
+              <a:t>os &lt;&lt; </a:t>
+            </a:r>
+            <a:r>
+              <a:rPr lang="en-US" sz="2000" smtClean="0">
+                <a:latin typeface="Consolas" panose="020B0609020204030204" pitchFamily="49" charset="0"/>
+              </a:rPr>
+              <a:t>"(";</a:t>
+            </a:r>
+            <a:r>
+              <a:rPr lang="ru-RU" sz="2000" smtClean="0">
+                <a:latin typeface="Consolas" panose="020B0609020204030204" pitchFamily="49" charset="0"/>
+              </a:rPr>
+              <a:t/>
+            </a:r>
+            <a:br>
+              <a:rPr lang="ru-RU" sz="2000" smtClean="0">
+                <a:latin typeface="Consolas" panose="020B0609020204030204" pitchFamily="49" charset="0"/>
+              </a:rPr>
+            </a:br>
+            <a:r>
+              <a:rPr lang="en-US" sz="2000" smtClean="0">
+                <a:latin typeface="Consolas" panose="020B0609020204030204" pitchFamily="49" charset="0"/>
+              </a:rPr>
+              <a:t>  </a:t>
+            </a:r>
+            <a:r>
+              <a:rPr lang="en-US" sz="2000">
+                <a:latin typeface="Consolas" panose="020B0609020204030204" pitchFamily="49" charset="0"/>
+              </a:rPr>
+              <a:t>print_tuple_impl(os, forward&lt;Tuple&gt;(t), </a:t>
+            </a:r>
+            <a:r>
+              <a:rPr lang="en-US" sz="2000">
+                <a:solidFill>
+                  <a:srgbClr val="0000FF"/>
+                </a:solidFill>
+                <a:latin typeface="Consolas" panose="020B0609020204030204" pitchFamily="49" charset="0"/>
+              </a:rPr>
+              <a:t>make_index_sequence&lt;sz</a:t>
             </a:r>
             <a:r>
               <a:rPr lang="en-US" sz="2000" smtClean="0">
@@ -18591,267 +18750,36 @@
                 </a:solidFill>
                 <a:latin typeface="Consolas" panose="020B0609020204030204" pitchFamily="49" charset="0"/>
               </a:rPr>
-              <a:t>")</a:t>
+              <a:t>&gt;{}</a:t>
+            </a:r>
+            <a:r>
+              <a:rPr lang="en-US" sz="2000" smtClean="0">
+                <a:latin typeface="Consolas" panose="020B0609020204030204" pitchFamily="49" charset="0"/>
+              </a:rPr>
+              <a:t>);</a:t>
             </a:r>
             <a:r>
               <a:rPr lang="ru-RU" sz="2000" smtClean="0">
-                <a:solidFill>
-                  <a:srgbClr val="0000FF"/>
-                </a:solidFill>
-                <a:latin typeface="Consolas" panose="020B0609020204030204" pitchFamily="49" charset="0"/>
-              </a:rPr>
-              <a:t> </a:t>
-            </a:r>
+                <a:latin typeface="Consolas" panose="020B0609020204030204" pitchFamily="49" charset="0"/>
+              </a:rPr>
+              <a:t/>
+            </a:r>
+            <a:br>
+              <a:rPr lang="ru-RU" sz="2000" smtClean="0">
+                <a:latin typeface="Consolas" panose="020B0609020204030204" pitchFamily="49" charset="0"/>
+              </a:rPr>
+            </a:br>
             <a:r>
               <a:rPr lang="en-US" sz="2000" smtClean="0">
-                <a:solidFill>
-                  <a:srgbClr val="0000FF"/>
-                </a:solidFill>
-                <a:latin typeface="Consolas" panose="020B0609020204030204" pitchFamily="49" charset="0"/>
-              </a:rPr>
-              <a:t>&lt;&lt; </a:t>
+                <a:latin typeface="Consolas" panose="020B0609020204030204" pitchFamily="49" charset="0"/>
+              </a:rPr>
+              <a:t>  </a:t>
             </a:r>
             <a:r>
               <a:rPr lang="en-US" sz="2000">
-                <a:solidFill>
-                  <a:srgbClr val="0000FF"/>
-                </a:solidFill>
-                <a:latin typeface="Consolas" panose="020B0609020204030204" pitchFamily="49" charset="0"/>
-              </a:rPr>
-              <a:t>get&lt;Is&gt;(forward&lt;Tuple&gt;(t</a:t>
-            </a:r>
-            <a:r>
-              <a:rPr lang="en-US" sz="2000">
-                <a:solidFill>
-                  <a:srgbClr val="0000FF"/>
-                </a:solidFill>
-                <a:latin typeface="Consolas" panose="020B0609020204030204" pitchFamily="49" charset="0"/>
-              </a:rPr>
-              <a:t>)))</a:t>
-            </a:r>
-            <a:r>
-              <a:rPr lang="en-US" sz="2000">
-                <a:latin typeface="Consolas" panose="020B0609020204030204" pitchFamily="49" charset="0"/>
-              </a:rPr>
-              <a:t>, </a:t>
-            </a:r>
-            <a:r>
-              <a:rPr lang="en-US" sz="2000" smtClean="0">
-                <a:latin typeface="Consolas" panose="020B0609020204030204" pitchFamily="49" charset="0"/>
-              </a:rPr>
-              <a:t>...);</a:t>
-            </a:r>
-            <a:r>
-              <a:rPr lang="ru-RU" sz="2000" smtClean="0">
-                <a:latin typeface="Consolas" panose="020B0609020204030204" pitchFamily="49" charset="0"/>
-              </a:rPr>
-              <a:t/>
-            </a:r>
-            <a:br>
-              <a:rPr lang="ru-RU" sz="2000" smtClean="0">
-                <a:latin typeface="Consolas" panose="020B0609020204030204" pitchFamily="49" charset="0"/>
-              </a:rPr>
-            </a:br>
-            <a:r>
-              <a:rPr lang="en-US" sz="2000" smtClean="0">
-                <a:latin typeface="Consolas" panose="020B0609020204030204" pitchFamily="49" charset="0"/>
-              </a:rPr>
-              <a:t>}</a:t>
-            </a:r>
-            <a:endParaRPr lang="ru-RU" sz="2000" smtClean="0">
-              <a:latin typeface="Consolas" panose="020B0609020204030204" pitchFamily="49" charset="0"/>
-            </a:endParaRPr>
-          </a:p>
-          <a:p>
-            <a:pPr marL="45720" indent="0">
-              <a:buNone/>
-            </a:pPr>
-            <a:r>
-              <a:rPr lang="en-US" sz="2000" smtClean="0">
-                <a:latin typeface="Consolas" panose="020B0609020204030204" pitchFamily="49" charset="0"/>
-              </a:rPr>
-              <a:t>template&lt;typename Tuple&gt;</a:t>
-            </a:r>
-            <a:r>
-              <a:rPr lang="ru-RU" sz="2000" smtClean="0">
-                <a:latin typeface="Consolas" panose="020B0609020204030204" pitchFamily="49" charset="0"/>
-              </a:rPr>
-              <a:t/>
-            </a:r>
-            <a:br>
-              <a:rPr lang="ru-RU" sz="2000" smtClean="0">
-                <a:latin typeface="Consolas" panose="020B0609020204030204" pitchFamily="49" charset="0"/>
-              </a:rPr>
-            </a:br>
-            <a:r>
-              <a:rPr lang="en-US" sz="2000" smtClean="0">
-                <a:latin typeface="Consolas" panose="020B0609020204030204" pitchFamily="49" charset="0"/>
-              </a:rPr>
-              <a:t>decltype(auto</a:t>
-            </a:r>
-            <a:r>
-              <a:rPr lang="en-US" sz="2000">
-                <a:latin typeface="Consolas" panose="020B0609020204030204" pitchFamily="49" charset="0"/>
-              </a:rPr>
-              <a:t>) operator&lt;&lt;(ostream&amp; os, Tuple &amp;&amp;</a:t>
-            </a:r>
-            <a:r>
-              <a:rPr lang="en-US" sz="2000">
-                <a:latin typeface="Consolas" panose="020B0609020204030204" pitchFamily="49" charset="0"/>
-              </a:rPr>
-              <a:t>t</a:t>
-            </a:r>
-            <a:r>
-              <a:rPr lang="en-US" sz="2000" smtClean="0">
-                <a:latin typeface="Consolas" panose="020B0609020204030204" pitchFamily="49" charset="0"/>
-              </a:rPr>
-              <a:t>){</a:t>
-            </a:r>
-            <a:r>
-              <a:rPr lang="ru-RU" sz="2000" smtClean="0">
-                <a:latin typeface="Consolas" panose="020B0609020204030204" pitchFamily="49" charset="0"/>
-              </a:rPr>
-              <a:t/>
-            </a:r>
-            <a:br>
-              <a:rPr lang="ru-RU" sz="2000" smtClean="0">
-                <a:latin typeface="Consolas" panose="020B0609020204030204" pitchFamily="49" charset="0"/>
-              </a:rPr>
-            </a:br>
-            <a:r>
-              <a:rPr lang="en-US" sz="2000" smtClean="0">
-                <a:latin typeface="Consolas" panose="020B0609020204030204" pitchFamily="49" charset="0"/>
-              </a:rPr>
-              <a:t>  </a:t>
-            </a:r>
-            <a:r>
-              <a:rPr lang="en-US" sz="2000">
-                <a:latin typeface="Consolas" panose="020B0609020204030204" pitchFamily="49" charset="0"/>
-              </a:rPr>
-              <a:t>constexpr size_t sz = tuple_size&lt;decay_t&lt;Tuple&gt;&gt;::</a:t>
-            </a:r>
-            <a:r>
-              <a:rPr lang="en-US" sz="2000">
-                <a:latin typeface="Consolas" panose="020B0609020204030204" pitchFamily="49" charset="0"/>
-              </a:rPr>
-              <a:t>value</a:t>
-            </a:r>
-            <a:r>
-              <a:rPr lang="en-US" sz="2000" smtClean="0">
-                <a:latin typeface="Consolas" panose="020B0609020204030204" pitchFamily="49" charset="0"/>
-              </a:rPr>
-              <a:t>;</a:t>
-            </a:r>
-            <a:r>
-              <a:rPr lang="ru-RU" sz="2000" smtClean="0">
-                <a:latin typeface="Consolas" panose="020B0609020204030204" pitchFamily="49" charset="0"/>
-              </a:rPr>
-              <a:t/>
-            </a:r>
-            <a:br>
-              <a:rPr lang="ru-RU" sz="2000" smtClean="0">
-                <a:latin typeface="Consolas" panose="020B0609020204030204" pitchFamily="49" charset="0"/>
-              </a:rPr>
-            </a:br>
-            <a:r>
-              <a:rPr lang="en-US" sz="2000" smtClean="0">
-                <a:latin typeface="Consolas" panose="020B0609020204030204" pitchFamily="49" charset="0"/>
-              </a:rPr>
-              <a:t>  </a:t>
-            </a:r>
-            <a:r>
-              <a:rPr lang="en-US" sz="2000">
-                <a:latin typeface="Consolas" panose="020B0609020204030204" pitchFamily="49" charset="0"/>
-              </a:rPr>
-              <a:t>os </a:t>
-            </a:r>
-            <a:r>
-              <a:rPr lang="en-US" sz="2000">
-                <a:latin typeface="Consolas" panose="020B0609020204030204" pitchFamily="49" charset="0"/>
-              </a:rPr>
-              <a:t>&lt;&lt; </a:t>
-            </a:r>
-            <a:r>
-              <a:rPr lang="en-US" sz="2000" smtClean="0">
-                <a:latin typeface="Consolas" panose="020B0609020204030204" pitchFamily="49" charset="0"/>
-              </a:rPr>
-              <a:t>"(";</a:t>
-            </a:r>
-            <a:r>
-              <a:rPr lang="ru-RU" sz="2000" smtClean="0">
-                <a:latin typeface="Consolas" panose="020B0609020204030204" pitchFamily="49" charset="0"/>
-              </a:rPr>
-              <a:t/>
-            </a:r>
-            <a:br>
-              <a:rPr lang="ru-RU" sz="2000" smtClean="0">
-                <a:latin typeface="Consolas" panose="020B0609020204030204" pitchFamily="49" charset="0"/>
-              </a:rPr>
-            </a:br>
-            <a:r>
-              <a:rPr lang="en-US" sz="2000" smtClean="0">
-                <a:latin typeface="Consolas" panose="020B0609020204030204" pitchFamily="49" charset="0"/>
-              </a:rPr>
-              <a:t>  </a:t>
-            </a:r>
-            <a:r>
-              <a:rPr lang="en-US" sz="2000">
-                <a:latin typeface="Consolas" panose="020B0609020204030204" pitchFamily="49" charset="0"/>
-              </a:rPr>
-              <a:t>print_tuple_impl(os, forward&lt;Tuple&gt;(t), </a:t>
-            </a:r>
-            <a:r>
-              <a:rPr lang="en-US" sz="2000">
-                <a:solidFill>
-                  <a:srgbClr val="0000FF"/>
-                </a:solidFill>
-                <a:latin typeface="Consolas" panose="020B0609020204030204" pitchFamily="49" charset="0"/>
-              </a:rPr>
-              <a:t>make_index_sequence&lt;sz</a:t>
-            </a:r>
-            <a:r>
-              <a:rPr lang="en-US" sz="2000" smtClean="0">
-                <a:solidFill>
-                  <a:srgbClr val="0000FF"/>
-                </a:solidFill>
-                <a:latin typeface="Consolas" panose="020B0609020204030204" pitchFamily="49" charset="0"/>
-              </a:rPr>
-              <a:t>&gt;{}</a:t>
-            </a:r>
-            <a:r>
-              <a:rPr lang="en-US" sz="2000" smtClean="0">
-                <a:latin typeface="Consolas" panose="020B0609020204030204" pitchFamily="49" charset="0"/>
-              </a:rPr>
-              <a:t>);</a:t>
-            </a:r>
-            <a:r>
-              <a:rPr lang="ru-RU" sz="2000" smtClean="0">
-                <a:latin typeface="Consolas" panose="020B0609020204030204" pitchFamily="49" charset="0"/>
-              </a:rPr>
-              <a:t/>
-            </a:r>
-            <a:br>
-              <a:rPr lang="ru-RU" sz="2000" smtClean="0">
-                <a:latin typeface="Consolas" panose="020B0609020204030204" pitchFamily="49" charset="0"/>
-              </a:rPr>
-            </a:br>
-            <a:r>
-              <a:rPr lang="en-US" sz="2000" smtClean="0">
-                <a:latin typeface="Consolas" panose="020B0609020204030204" pitchFamily="49" charset="0"/>
-              </a:rPr>
-              <a:t>  </a:t>
-            </a:r>
-            <a:r>
-              <a:rPr lang="en-US" sz="2000">
-                <a:latin typeface="Consolas" panose="020B0609020204030204" pitchFamily="49" charset="0"/>
-              </a:rPr>
-              <a:t>return os </a:t>
-            </a:r>
-            <a:r>
-              <a:rPr lang="en-US" sz="2000">
-                <a:latin typeface="Consolas" panose="020B0609020204030204" pitchFamily="49" charset="0"/>
-              </a:rPr>
-              <a:t>&lt;&lt; </a:t>
+                <a:latin typeface="Consolas" panose="020B0609020204030204" pitchFamily="49" charset="0"/>
+              </a:rPr>
+              <a:t>return os &lt;&lt; </a:t>
             </a:r>
             <a:r>
               <a:rPr lang="en-US" sz="2000" smtClean="0">
@@ -18973,24 +18901,59 @@
               <a:rPr lang="en-US" sz="2000">
                 <a:latin typeface="Consolas" panose="020B0609020204030204" pitchFamily="49" charset="0"/>
               </a:rPr>
-              <a:t>template&lt;typename Tuple, size_t... </a:t>
+              <a:t>template&lt;typename Tuple, size_t... Is</a:t>
+            </a:r>
+            <a:r>
+              <a:rPr lang="en-US" sz="2000" smtClean="0">
+                <a:latin typeface="Consolas" panose="020B0609020204030204" pitchFamily="49" charset="0"/>
+              </a:rPr>
+              <a:t>&gt;</a:t>
+            </a:r>
+            <a:r>
+              <a:rPr lang="ru-RU" sz="2000" smtClean="0">
+                <a:latin typeface="Consolas" panose="020B0609020204030204" pitchFamily="49" charset="0"/>
+              </a:rPr>
+              <a:t/>
+            </a:r>
+            <a:br>
+              <a:rPr lang="ru-RU" sz="2000" smtClean="0">
+                <a:latin typeface="Consolas" panose="020B0609020204030204" pitchFamily="49" charset="0"/>
+              </a:rPr>
+            </a:br>
+            <a:r>
+              <a:rPr lang="en-US" sz="2000" smtClean="0">
+                <a:latin typeface="Consolas" panose="020B0609020204030204" pitchFamily="49" charset="0"/>
+              </a:rPr>
+              <a:t>void </a:t>
             </a:r>
             <a:r>
               <a:rPr lang="en-US" sz="2000">
                 <a:latin typeface="Consolas" panose="020B0609020204030204" pitchFamily="49" charset="0"/>
               </a:rPr>
-              <a:t>Is</a:t>
+              <a:t>print_tuple_impl(ostream&amp; os, Tuple &amp;&amp;t, index_sequence&lt;Is</a:t>
             </a:r>
             <a:r>
               <a:rPr lang="en-US" sz="2000" smtClean="0">
                 <a:latin typeface="Consolas" panose="020B0609020204030204" pitchFamily="49" charset="0"/>
               </a:rPr>
-              <a:t>&gt;</a:t>
+              <a:t>...&gt;)</a:t>
             </a:r>
             <a:r>
               <a:rPr lang="ru-RU" sz="2000" smtClean="0">
                 <a:latin typeface="Consolas" panose="020B0609020204030204" pitchFamily="49" charset="0"/>
               </a:rPr>
+              <a:t> </a:t>
+            </a:r>
+            <a:r>
+              <a:rPr lang="en-US" sz="2000" smtClean="0">
+                <a:latin typeface="Consolas" panose="020B0609020204030204" pitchFamily="49" charset="0"/>
+              </a:rPr>
+              <a:t>{</a:t>
+            </a:r>
+            <a:r>
+              <a:rPr lang="ru-RU" sz="2000" smtClean="0">
+                <a:latin typeface="Consolas" panose="020B0609020204030204" pitchFamily="49" charset="0"/>
+              </a:rPr>
               <a:t/>
             </a:r>
             <a:br>
@@ -19002,96 +18965,37 @@
               <a:rPr lang="en-US" sz="2000" smtClean="0">
                 <a:latin typeface="Consolas" panose="020B0609020204030204" pitchFamily="49" charset="0"/>
               </a:rPr>
-              <a:t>void </a:t>
+              <a:t>  </a:t>
             </a:r>
             <a:r>
               <a:rPr lang="en-US" sz="2000">
                 <a:latin typeface="Consolas" panose="020B0609020204030204" pitchFamily="49" charset="0"/>
               </a:rPr>
-              <a:t>print_tuple_impl(ostream&amp; os, Tuple &amp;&amp;t, </a:t>
+              <a:t>((os &lt;&lt; (Is == 0 ? "" : ", </a:t>
+            </a:r>
+            <a:r>
+              <a:rPr lang="en-US" sz="2000" smtClean="0">
+                <a:latin typeface="Consolas" panose="020B0609020204030204" pitchFamily="49" charset="0"/>
+              </a:rPr>
+              <a:t>")</a:t>
+            </a:r>
+            <a:r>
+              <a:rPr lang="ru-RU" sz="2000" smtClean="0">
+                <a:latin typeface="Consolas" panose="020B0609020204030204" pitchFamily="49" charset="0"/>
+              </a:rPr>
+              <a:t> </a:t>
+            </a:r>
+            <a:r>
+              <a:rPr lang="en-US" sz="2000" smtClean="0">
+                <a:latin typeface="Consolas" panose="020B0609020204030204" pitchFamily="49" charset="0"/>
+              </a:rPr>
+              <a:t>&lt;&lt; </a:t>
             </a:r>
             <a:r>
               <a:rPr lang="en-US" sz="2000">
                 <a:latin typeface="Consolas" panose="020B0609020204030204" pitchFamily="49" charset="0"/>
               </a:rPr>
-              <a:t>index_sequence&lt;Is</a:t>
-            </a:r>
-            <a:r>
-              <a:rPr lang="en-US" sz="2000" smtClean="0">
-                <a:latin typeface="Consolas" panose="020B0609020204030204" pitchFamily="49" charset="0"/>
-              </a:rPr>
-              <a:t>...&gt;)</a:t>
-            </a:r>
-            <a:r>
-              <a:rPr lang="ru-RU" sz="2000" smtClean="0">
-                <a:latin typeface="Consolas" panose="020B0609020204030204" pitchFamily="49" charset="0"/>
-              </a:rPr>
-              <a:t> </a:t>
-            </a:r>
-            <a:r>
-              <a:rPr lang="en-US" sz="2000" smtClean="0">
-                <a:latin typeface="Consolas" panose="020B0609020204030204" pitchFamily="49" charset="0"/>
-              </a:rPr>
-              <a:t>{</a:t>
-            </a:r>
-            <a:r>
-              <a:rPr lang="ru-RU" sz="2000" smtClean="0">
-                <a:latin typeface="Consolas" panose="020B0609020204030204" pitchFamily="49" charset="0"/>
-              </a:rPr>
-              <a:t/>
-            </a:r>
-            <a:br>
-              <a:rPr lang="ru-RU" sz="2000" smtClean="0">
-                <a:latin typeface="Consolas" panose="020B0609020204030204" pitchFamily="49" charset="0"/>
-              </a:rPr>
-            </a:br>
-            <a:r>
-              <a:rPr lang="en-US" sz="2000" smtClean="0">
-                <a:latin typeface="Consolas" panose="020B0609020204030204" pitchFamily="49" charset="0"/>
-              </a:rPr>
-              <a:t>  </a:t>
-            </a:r>
-            <a:r>
-              <a:rPr lang="en-US" sz="2000">
-                <a:latin typeface="Consolas" panose="020B0609020204030204" pitchFamily="49" charset="0"/>
-              </a:rPr>
-              <a:t>((os &lt;&lt; (Is == 0 ? "" : </a:t>
-            </a:r>
-            <a:r>
-              <a:rPr lang="en-US" sz="2000">
-                <a:latin typeface="Consolas" panose="020B0609020204030204" pitchFamily="49" charset="0"/>
-              </a:rPr>
-              <a:t>", </a:t>
-            </a:r>
-            <a:r>
-              <a:rPr lang="en-US" sz="2000" smtClean="0">
-                <a:latin typeface="Consolas" panose="020B0609020204030204" pitchFamily="49" charset="0"/>
-              </a:rPr>
-              <a:t>")</a:t>
-            </a:r>
-            <a:r>
-              <a:rPr lang="ru-RU" sz="2000" smtClean="0">
-                <a:latin typeface="Consolas" panose="020B0609020204030204" pitchFamily="49" charset="0"/>
-              </a:rPr>
-              <a:t> </a:t>
-            </a:r>
-            <a:r>
-              <a:rPr lang="en-US" sz="2000" smtClean="0">
-                <a:latin typeface="Consolas" panose="020B0609020204030204" pitchFamily="49" charset="0"/>
-              </a:rPr>
-              <a:t>&lt;&lt; </a:t>
-            </a:r>
-            <a:r>
-              <a:rPr lang="en-US" sz="2000">
-                <a:latin typeface="Consolas" panose="020B0609020204030204" pitchFamily="49" charset="0"/>
-              </a:rPr>
-              <a:t>get&lt;Is&gt;(forward&lt;Tuple&gt;(t</a:t>
-            </a:r>
-            <a:r>
-              <a:rPr lang="en-US" sz="2000">
-                <a:latin typeface="Consolas" panose="020B0609020204030204" pitchFamily="49" charset="0"/>
-              </a:rPr>
-              <a:t>))), </a:t>
+              <a:t>get&lt;Is&gt;(forward&lt;Tuple&gt;(t))), </a:t>
             </a:r>
             <a:r>
               <a:rPr lang="en-US" sz="2000" smtClean="0">
@@ -19143,16 +19047,7 @@
                 </a:solidFill>
                 <a:latin typeface="Consolas" panose="020B0609020204030204" pitchFamily="49" charset="0"/>
               </a:rPr>
-              <a:t>typename = void_t&lt;decltype(get&lt;0&gt;(</a:t>
-            </a:r>
-            <a:r>
-              <a:rPr lang="en-US" sz="2000">
-                <a:solidFill>
-                  <a:srgbClr val="0000FF"/>
-                </a:solidFill>
-                <a:latin typeface="Consolas" panose="020B0609020204030204" pitchFamily="49" charset="0"/>
-              </a:rPr>
-              <a:t>Tuple</a:t>
+              <a:t>typename = void_t&lt;decltype(get&lt;0&gt;(Tuple</a:t>
             </a:r>
             <a:r>
               <a:rPr lang="en-US" sz="2000" smtClean="0">
@@ -19190,19 +19085,42 @@
               <a:rPr lang="en-US" sz="2000">
                 <a:latin typeface="Consolas" panose="020B0609020204030204" pitchFamily="49" charset="0"/>
               </a:rPr>
-              <a:t>) operator&lt;&lt;(ostream&amp; os, Tuple &amp;&amp;</a:t>
+              <a:t>) operator&lt;&lt;(ostream&amp; os, Tuple &amp;&amp;t</a:t>
+            </a:r>
+            <a:r>
+              <a:rPr lang="en-US" sz="2000" smtClean="0">
+                <a:latin typeface="Consolas" panose="020B0609020204030204" pitchFamily="49" charset="0"/>
+              </a:rPr>
+              <a:t>){</a:t>
+            </a:r>
+            <a:r>
+              <a:rPr lang="ru-RU" sz="2000" smtClean="0">
+                <a:latin typeface="Consolas" panose="020B0609020204030204" pitchFamily="49" charset="0"/>
+              </a:rPr>
+              <a:t/>
+            </a:r>
+            <a:br>
+              <a:rPr lang="ru-RU" sz="2000" smtClean="0">
+                <a:latin typeface="Consolas" panose="020B0609020204030204" pitchFamily="49" charset="0"/>
+              </a:rPr>
+            </a:br>
+            <a:r>
+              <a:rPr lang="en-US" sz="2000" smtClean="0">
+                <a:latin typeface="Consolas" panose="020B0609020204030204" pitchFamily="49" charset="0"/>
+              </a:rPr>
+              <a:t>  </a:t>
             </a:r>
             <a:r>
               <a:rPr lang="en-US" sz="2000">
                 <a:latin typeface="Consolas" panose="020B0609020204030204" pitchFamily="49" charset="0"/>
               </a:rPr>
-              <a:t>t</a:t>
+              <a:t>constexpr size_t sz = tuple_size&lt;decay_t&lt;Tuple&gt;&gt;::value</a:t>
             </a:r>
             <a:r>
               <a:rPr lang="en-US" sz="2000" smtClean="0">
                 <a:latin typeface="Consolas" panose="020B0609020204030204" pitchFamily="49" charset="0"/>
               </a:rPr>
-              <a:t>){</a:t>
+              <a:t>;</a:t>
             </a:r>
             <a:r>
               <a:rPr lang="ru-RU" sz="2000" smtClean="0">
@@ -19225,19 +19143,42 @@
               <a:rPr lang="en-US" sz="2000">
                 <a:latin typeface="Consolas" panose="020B0609020204030204" pitchFamily="49" charset="0"/>
               </a:rPr>
-              <a:t>constexpr size_t sz = tuple_size&lt;decay_t&lt;Tuple&gt;&gt;::</a:t>
+              <a:t>os &lt;&lt; </a:t>
+            </a:r>
+            <a:r>
+              <a:rPr lang="en-US" sz="2000" smtClean="0">
+                <a:latin typeface="Consolas" panose="020B0609020204030204" pitchFamily="49" charset="0"/>
+              </a:rPr>
+              <a:t>"(";</a:t>
+            </a:r>
+            <a:r>
+              <a:rPr lang="ru-RU" sz="2000" smtClean="0">
+                <a:latin typeface="Consolas" panose="020B0609020204030204" pitchFamily="49" charset="0"/>
+              </a:rPr>
+              <a:t/>
+            </a:r>
+            <a:br>
+              <a:rPr lang="ru-RU" sz="2000" smtClean="0">
+                <a:latin typeface="Consolas" panose="020B0609020204030204" pitchFamily="49" charset="0"/>
+              </a:rPr>
+            </a:br>
+            <a:r>
+              <a:rPr lang="en-US" sz="2000" smtClean="0">
+                <a:latin typeface="Consolas" panose="020B0609020204030204" pitchFamily="49" charset="0"/>
+              </a:rPr>
+              <a:t>  </a:t>
             </a:r>
             <a:r>
               <a:rPr lang="en-US" sz="2000">
                 <a:latin typeface="Consolas" panose="020B0609020204030204" pitchFamily="49" charset="0"/>
               </a:rPr>
-              <a:t>value</a:t>
+              <a:t>print_tuple_impl(os, forward&lt;Tuple&gt;(t), make_index_sequence&lt;sz</a:t>
             </a:r>
             <a:r>
               <a:rPr lang="en-US" sz="2000" smtClean="0">
                 <a:latin typeface="Consolas" panose="020B0609020204030204" pitchFamily="49" charset="0"/>
               </a:rPr>
-              <a:t>;</a:t>
+              <a:t>&gt;{});</a:t>
             </a:r>
             <a:r>
               <a:rPr lang="ru-RU" sz="2000" smtClean="0">
@@ -19260,83 +19201,7 @@
               <a:rPr lang="en-US" sz="2000">
                 <a:latin typeface="Consolas" panose="020B0609020204030204" pitchFamily="49" charset="0"/>
               </a:rPr>
-              <a:t>os </a:t>
-            </a:r>
-            <a:r>
-              <a:rPr lang="en-US" sz="2000">
-                <a:latin typeface="Consolas" panose="020B0609020204030204" pitchFamily="49" charset="0"/>
-              </a:rPr>
-              <a:t>&lt;&lt; </a:t>
-            </a:r>
-            <a:r>
-              <a:rPr lang="en-US" sz="2000" smtClean="0">
-                <a:latin typeface="Consolas" panose="020B0609020204030204" pitchFamily="49" charset="0"/>
-              </a:rPr>
-              <a:t>"(";</a:t>
-            </a:r>
-            <a:r>
-              <a:rPr lang="ru-RU" sz="2000" smtClean="0">
-                <a:latin typeface="Consolas" panose="020B0609020204030204" pitchFamily="49" charset="0"/>
-              </a:rPr>
-              <a:t/>
-            </a:r>
-            <a:br>
-              <a:rPr lang="ru-RU" sz="2000" smtClean="0">
-                <a:latin typeface="Consolas" panose="020B0609020204030204" pitchFamily="49" charset="0"/>
-              </a:rPr>
-            </a:br>
-            <a:r>
-              <a:rPr lang="en-US" sz="2000" smtClean="0">
-                <a:latin typeface="Consolas" panose="020B0609020204030204" pitchFamily="49" charset="0"/>
-              </a:rPr>
-              <a:t>  </a:t>
-            </a:r>
-            <a:r>
-              <a:rPr lang="en-US" sz="2000">
-                <a:latin typeface="Consolas" panose="020B0609020204030204" pitchFamily="49" charset="0"/>
-              </a:rPr>
-              <a:t>print_tuple_impl(os, forward&lt;Tuple&gt;(t), </a:t>
-            </a:r>
-            <a:r>
-              <a:rPr lang="en-US" sz="2000">
-                <a:latin typeface="Consolas" panose="020B0609020204030204" pitchFamily="49" charset="0"/>
-              </a:rPr>
-              <a:t>make_index_sequence&lt;sz</a:t>
-            </a:r>
-            <a:r>
-              <a:rPr lang="en-US" sz="2000" smtClean="0">
-                <a:latin typeface="Consolas" panose="020B0609020204030204" pitchFamily="49" charset="0"/>
-              </a:rPr>
-              <a:t>&gt;{});</a:t>
-            </a:r>
-            <a:r>
-              <a:rPr lang="ru-RU" sz="2000" smtClean="0">
-                <a:latin typeface="Consolas" panose="020B0609020204030204" pitchFamily="49" charset="0"/>
-              </a:rPr>
-              <a:t/>
-            </a:r>
-            <a:br>
-              <a:rPr lang="ru-RU" sz="2000" smtClean="0">
-                <a:latin typeface="Consolas" panose="020B0609020204030204" pitchFamily="49" charset="0"/>
-              </a:rPr>
-            </a:br>
-            <a:r>
-              <a:rPr lang="en-US" sz="2000" smtClean="0">
-                <a:latin typeface="Consolas" panose="020B0609020204030204" pitchFamily="49" charset="0"/>
-              </a:rPr>
-              <a:t>  </a:t>
-            </a:r>
-            <a:r>
-              <a:rPr lang="en-US" sz="2000">
-                <a:latin typeface="Consolas" panose="020B0609020204030204" pitchFamily="49" charset="0"/>
-              </a:rPr>
-              <a:t>return os </a:t>
-            </a:r>
-            <a:r>
-              <a:rPr lang="en-US" sz="2000">
-                <a:latin typeface="Consolas" panose="020B0609020204030204" pitchFamily="49" charset="0"/>
-              </a:rPr>
-              <a:t>&lt;&lt; </a:t>
+              <a:t>return os &lt;&lt; </a:t>
             </a:r>
             <a:r>
               <a:rPr lang="en-US" sz="2000" smtClean="0">
@@ -19506,13 +19371,7 @@
               <a:rPr lang="en-US">
                 <a:latin typeface="Consolas" panose="020B0609020204030204" pitchFamily="49" charset="0"/>
               </a:rPr>
-              <a:t>{ 1, 1.5, 2, 2.5</a:t>
-            </a:r>
-            <a:r>
-              <a:rPr lang="en-US">
-                <a:latin typeface="Consolas" panose="020B0609020204030204" pitchFamily="49" charset="0"/>
-              </a:rPr>
-              <a:t>, </a:t>
+              <a:t>{ 1, 1.5, 2, 2.5, </a:t>
             </a:r>
             <a:r>
               <a:rPr lang="en-US" smtClean="0">
@@ -19532,14 +19391,7 @@
                 <a:latin typeface="Consolas" panose="020B0609020204030204" pitchFamily="49" charset="0"/>
                 <a:sym typeface="Symbol" panose="05050102010706020507" pitchFamily="18" charset="2"/>
               </a:rPr>
-              <a:t> </a:t>
-            </a:r>
-            <a:r>
-              <a:rPr lang="en-US">
-                <a:latin typeface="Consolas" panose="020B0609020204030204" pitchFamily="49" charset="0"/>
-                <a:sym typeface="Symbol" panose="05050102010706020507" pitchFamily="18" charset="2"/>
-              </a:rPr>
-              <a:t>{ </a:t>
+              <a:t> { </a:t>
             </a:r>
             <a:r>
               <a:rPr lang="en-US" smtClean="0">
@@ -19583,13 +19435,7 @@
               <a:rPr lang="en-US">
                 <a:latin typeface="Consolas" panose="020B0609020204030204" pitchFamily="49" charset="0"/>
               </a:rPr>
-              <a:t>{ 1, 1.5, 2, 2.5</a:t>
-            </a:r>
-            <a:r>
-              <a:rPr lang="en-US">
-                <a:latin typeface="Consolas" panose="020B0609020204030204" pitchFamily="49" charset="0"/>
-              </a:rPr>
-              <a:t>, </a:t>
+              <a:t>{ 1, 1.5, 2, 2.5, </a:t>
             </a:r>
             <a:r>
               <a:rPr lang="en-US" smtClean="0">
@@ -19609,49 +19455,28 @@
                 <a:latin typeface="Consolas" panose="020B0609020204030204" pitchFamily="49" charset="0"/>
                 <a:sym typeface="Symbol" panose="05050102010706020507" pitchFamily="18" charset="2"/>
               </a:rPr>
-              <a:t> </a:t>
-            </a:r>
-            <a:r>
-              <a:rPr lang="en-US">
+              <a:t> { </a:t>
+            </a:r>
+            <a:r>
+              <a:rPr lang="en-US" smtClean="0">
                 <a:latin typeface="Consolas" panose="020B0609020204030204" pitchFamily="49" charset="0"/>
                 <a:sym typeface="Symbol" panose="05050102010706020507" pitchFamily="18" charset="2"/>
               </a:rPr>
-              <a:t>{ </a:t>
-            </a:r>
-            <a:r>
-              <a:rPr lang="en-US" smtClean="0">
+              <a:t>1, 2, </a:t>
+            </a:r>
+            <a:r>
+              <a:rPr lang="en-US">
                 <a:latin typeface="Consolas" panose="020B0609020204030204" pitchFamily="49" charset="0"/>
                 <a:sym typeface="Symbol" panose="05050102010706020507" pitchFamily="18" charset="2"/>
               </a:rPr>
-              <a:t>1, 2, </a:t>
-            </a:r>
-            <a:r>
-              <a:rPr lang="en-US">
+              <a:t>1.5</a:t>
+            </a:r>
+            <a:r>
+              <a:rPr lang="en-US" smtClean="0">
                 <a:latin typeface="Consolas" panose="020B0609020204030204" pitchFamily="49" charset="0"/>
                 <a:sym typeface="Symbol" panose="05050102010706020507" pitchFamily="18" charset="2"/>
               </a:rPr>
-              <a:t>1.5</a:t>
-            </a:r>
-            <a:r>
-              <a:rPr lang="en-US" smtClean="0">
-                <a:latin typeface="Consolas" panose="020B0609020204030204" pitchFamily="49" charset="0"/>
-                <a:sym typeface="Symbol" panose="05050102010706020507" pitchFamily="18" charset="2"/>
-              </a:rPr>
-              <a:t>, 2.5, </a:t>
-            </a:r>
-            <a:r>
-              <a:rPr lang="en-US" smtClean="0">
-                <a:latin typeface="Consolas" panose="020B0609020204030204" pitchFamily="49" charset="0"/>
-                <a:sym typeface="Symbol" panose="05050102010706020507" pitchFamily="18" charset="2"/>
-              </a:rPr>
-              <a:t>3</a:t>
-            </a:r>
-            <a:r>
-              <a:rPr lang="en-US" smtClean="0">
-                <a:latin typeface="Consolas" panose="020B0609020204030204" pitchFamily="49" charset="0"/>
-                <a:sym typeface="Symbol" panose="05050102010706020507" pitchFamily="18" charset="2"/>
-              </a:rPr>
-              <a:t> }</a:t>
+              <a:t>, 2.5, 3 }</a:t>
             </a:r>
             <a:endParaRPr lang="en-US" smtClean="0"/>
           </a:p>
@@ -19674,13 +19499,7 @@
               <a:rPr lang="en-US">
                 <a:latin typeface="Consolas" panose="020B0609020204030204" pitchFamily="49" charset="0"/>
               </a:rPr>
-              <a:t>{ 1, 1.5, 2, 2.5</a:t>
-            </a:r>
-            <a:r>
-              <a:rPr lang="en-US">
-                <a:latin typeface="Consolas" panose="020B0609020204030204" pitchFamily="49" charset="0"/>
-              </a:rPr>
-              <a:t>, </a:t>
+              <a:t>{ 1, 1.5, 2, 2.5, </a:t>
             </a:r>
             <a:r>
               <a:rPr lang="en-US" smtClean="0">
@@ -19718,13 +19537,7 @@
               <a:rPr lang="en-US">
                 <a:latin typeface="Consolas" panose="020B0609020204030204" pitchFamily="49" charset="0"/>
               </a:rPr>
-              <a:t>, 2.5, 1, 2</a:t>
-            </a:r>
-            <a:r>
-              <a:rPr lang="en-US">
-                <a:latin typeface="Consolas" panose="020B0609020204030204" pitchFamily="49" charset="0"/>
-              </a:rPr>
-              <a:t>, </a:t>
+              <a:t>, 2.5, 1, 2, </a:t>
             </a:r>
             <a:r>
               <a:rPr lang="en-US" smtClean="0">
@@ -19822,42 +19635,30 @@
               <a:rPr lang="en-US" sz="2000">
                 <a:latin typeface="Consolas" panose="020B0609020204030204" pitchFamily="49" charset="0"/>
               </a:rPr>
-              <a:t>template&lt;size_t start, typename Tuple, size_t... </a:t>
+              <a:t>template&lt;size_t start, typename Tuple, size_t... Is</a:t>
+            </a:r>
+            <a:r>
+              <a:rPr lang="en-US" sz="2000" smtClean="0">
+                <a:latin typeface="Consolas" panose="020B0609020204030204" pitchFamily="49" charset="0"/>
+              </a:rPr>
+              <a:t>&gt;</a:t>
+            </a:r>
+            <a:br>
+              <a:rPr lang="en-US" sz="2000" smtClean="0">
+                <a:latin typeface="Consolas" panose="020B0609020204030204" pitchFamily="49" charset="0"/>
+              </a:rPr>
+            </a:br>
+            <a:r>
+              <a:rPr lang="en-US" sz="2000" smtClean="0">
+                <a:latin typeface="Consolas" panose="020B0609020204030204" pitchFamily="49" charset="0"/>
+              </a:rPr>
+              <a:t>constexpr </a:t>
             </a:r>
             <a:r>
               <a:rPr lang="en-US" sz="2000">
                 <a:latin typeface="Consolas" panose="020B0609020204030204" pitchFamily="49" charset="0"/>
               </a:rPr>
-              <a:t>Is</a:t>
-            </a:r>
-            <a:r>
-              <a:rPr lang="en-US" sz="2000" smtClean="0">
-                <a:latin typeface="Consolas" panose="020B0609020204030204" pitchFamily="49" charset="0"/>
-              </a:rPr>
-              <a:t>&gt;</a:t>
-            </a:r>
-            <a:br>
-              <a:rPr lang="en-US" sz="2000" smtClean="0">
-                <a:latin typeface="Consolas" panose="020B0609020204030204" pitchFamily="49" charset="0"/>
-              </a:rPr>
-            </a:br>
-            <a:r>
-              <a:rPr lang="en-US" sz="2000" smtClean="0">
-                <a:latin typeface="Consolas" panose="020B0609020204030204" pitchFamily="49" charset="0"/>
-              </a:rPr>
-              <a:t>constexpr </a:t>
-            </a:r>
-            <a:r>
-              <a:rPr lang="en-US" sz="2000">
-                <a:latin typeface="Consolas" panose="020B0609020204030204" pitchFamily="49" charset="0"/>
-              </a:rPr>
-              <a:t>auto subtuple_impl(Tuple &amp;&amp;t, index_sequence&lt;Is</a:t>
-            </a:r>
-            <a:r>
-              <a:rPr lang="en-US" sz="2000">
-                <a:latin typeface="Consolas" panose="020B0609020204030204" pitchFamily="49" charset="0"/>
-              </a:rPr>
-              <a:t>...&gt;) </a:t>
+              <a:t>auto subtuple_impl(Tuple &amp;&amp;t, index_sequence&lt;Is...&gt;) </a:t>
             </a:r>
             <a:r>
               <a:rPr lang="en-US" sz="2000" smtClean="0">
@@ -19889,16 +19690,7 @@
                 </a:solidFill>
                 <a:latin typeface="Consolas" panose="020B0609020204030204" pitchFamily="49" charset="0"/>
               </a:rPr>
-              <a:t>get&lt;Is + start&gt;(forward&lt;Tuple&gt;(</a:t>
-            </a:r>
-            <a:r>
-              <a:rPr lang="en-US" sz="2000">
-                <a:solidFill>
-                  <a:srgbClr val="0000FF"/>
-                </a:solidFill>
-                <a:latin typeface="Consolas" panose="020B0609020204030204" pitchFamily="49" charset="0"/>
-              </a:rPr>
-              <a:t>t</a:t>
+              <a:t>get&lt;Is + start&gt;(forward&lt;Tuple&gt;(t</a:t>
             </a:r>
             <a:r>
               <a:rPr lang="en-US" sz="2000" smtClean="0">
@@ -19941,42 +19733,30 @@
               <a:rPr lang="en-US" sz="2000">
                 <a:latin typeface="Consolas" panose="020B0609020204030204" pitchFamily="49" charset="0"/>
               </a:rPr>
-              <a:t>start, size_t finish, typename </a:t>
+              <a:t>start, size_t finish, typename Tuple</a:t>
+            </a:r>
+            <a:r>
+              <a:rPr lang="en-US" sz="2000" smtClean="0">
+                <a:latin typeface="Consolas" panose="020B0609020204030204" pitchFamily="49" charset="0"/>
+              </a:rPr>
+              <a:t>&gt;</a:t>
+            </a:r>
+            <a:br>
+              <a:rPr lang="en-US" sz="2000" smtClean="0">
+                <a:latin typeface="Consolas" panose="020B0609020204030204" pitchFamily="49" charset="0"/>
+              </a:rPr>
+            </a:br>
+            <a:r>
+              <a:rPr lang="en-US" sz="2000" smtClean="0">
+                <a:latin typeface="Consolas" panose="020B0609020204030204" pitchFamily="49" charset="0"/>
+              </a:rPr>
+              <a:t>constexpr </a:t>
             </a:r>
             <a:r>
               <a:rPr lang="en-US" sz="2000">
                 <a:latin typeface="Consolas" panose="020B0609020204030204" pitchFamily="49" charset="0"/>
               </a:rPr>
-              <a:t>Tuple</a:t>
-            </a:r>
-            <a:r>
-              <a:rPr lang="en-US" sz="2000" smtClean="0">
-                <a:latin typeface="Consolas" panose="020B0609020204030204" pitchFamily="49" charset="0"/>
-              </a:rPr>
-              <a:t>&gt;</a:t>
-            </a:r>
-            <a:br>
-              <a:rPr lang="en-US" sz="2000" smtClean="0">
-                <a:latin typeface="Consolas" panose="020B0609020204030204" pitchFamily="49" charset="0"/>
-              </a:rPr>
-            </a:br>
-            <a:r>
-              <a:rPr lang="en-US" sz="2000" smtClean="0">
-                <a:latin typeface="Consolas" panose="020B0609020204030204" pitchFamily="49" charset="0"/>
-              </a:rPr>
-              <a:t>constexpr </a:t>
-            </a:r>
-            <a:r>
-              <a:rPr lang="en-US" sz="2000">
-                <a:latin typeface="Consolas" panose="020B0609020204030204" pitchFamily="49" charset="0"/>
-              </a:rPr>
-              <a:t>auto subtuple(Tuple&amp;&amp; t</a:t>
-            </a:r>
-            <a:r>
-              <a:rPr lang="en-US" sz="2000">
-                <a:latin typeface="Consolas" panose="020B0609020204030204" pitchFamily="49" charset="0"/>
-              </a:rPr>
-              <a:t>) </a:t>
+              <a:t>auto subtuple(Tuple&amp;&amp; t) </a:t>
             </a:r>
             <a:r>
               <a:rPr lang="en-US" sz="2000" smtClean="0">
@@ -20031,42 +19811,30 @@
               <a:rPr lang="en-US" sz="2000">
                 <a:latin typeface="Consolas" panose="020B0609020204030204" pitchFamily="49" charset="0"/>
               </a:rPr>
-              <a:t>constexpr size_t sz = finish - </a:t>
+              <a:t>constexpr size_t sz = finish - start</a:t>
+            </a:r>
+            <a:r>
+              <a:rPr lang="en-US" sz="2000" smtClean="0">
+                <a:latin typeface="Consolas" panose="020B0609020204030204" pitchFamily="49" charset="0"/>
+              </a:rPr>
+              <a:t>;</a:t>
+            </a:r>
+            <a:br>
+              <a:rPr lang="en-US" sz="2000" smtClean="0">
+                <a:latin typeface="Consolas" panose="020B0609020204030204" pitchFamily="49" charset="0"/>
+              </a:rPr>
+            </a:br>
+            <a:r>
+              <a:rPr lang="en-US" sz="2000" smtClean="0">
+                <a:latin typeface="Consolas" panose="020B0609020204030204" pitchFamily="49" charset="0"/>
+              </a:rPr>
+              <a:t>  </a:t>
             </a:r>
             <a:r>
               <a:rPr lang="en-US" sz="2000">
                 <a:latin typeface="Consolas" panose="020B0609020204030204" pitchFamily="49" charset="0"/>
               </a:rPr>
-              <a:t>start</a:t>
-            </a:r>
-            <a:r>
-              <a:rPr lang="en-US" sz="2000" smtClean="0">
-                <a:latin typeface="Consolas" panose="020B0609020204030204" pitchFamily="49" charset="0"/>
-              </a:rPr>
-              <a:t>;</a:t>
-            </a:r>
-            <a:br>
-              <a:rPr lang="en-US" sz="2000" smtClean="0">
-                <a:latin typeface="Consolas" panose="020B0609020204030204" pitchFamily="49" charset="0"/>
-              </a:rPr>
-            </a:br>
-            <a:r>
-              <a:rPr lang="en-US" sz="2000" smtClean="0">
-                <a:latin typeface="Consolas" panose="020B0609020204030204" pitchFamily="49" charset="0"/>
-              </a:rPr>
-              <a:t>  </a:t>
-            </a:r>
-            <a:r>
-              <a:rPr lang="en-US" sz="2000">
-                <a:latin typeface="Consolas" panose="020B0609020204030204" pitchFamily="49" charset="0"/>
-              </a:rPr>
-              <a:t>return subtuple_impl&lt;start&gt;(forward&lt;Tuple&gt;(t</a:t>
-            </a:r>
-            <a:r>
-              <a:rPr lang="en-US" sz="2000">
-                <a:latin typeface="Consolas" panose="020B0609020204030204" pitchFamily="49" charset="0"/>
-              </a:rPr>
-              <a:t>), </a:t>
+              <a:t>return subtuple_impl&lt;start&gt;(forward&lt;Tuple&gt;(t), </a:t>
             </a:r>
             <a:r>
               <a:rPr lang="en-US" sz="2000" smtClean="0">
@@ -20518,13 +20286,7 @@
               <a:rPr lang="en-US">
                 <a:latin typeface="Consolas" panose="020B0609020204030204" pitchFamily="49" charset="0"/>
               </a:rPr>
-              <a:t>{ 1, 1.5, 2, 2.5</a:t>
-            </a:r>
-            <a:r>
-              <a:rPr lang="en-US">
-                <a:latin typeface="Consolas" panose="020B0609020204030204" pitchFamily="49" charset="0"/>
-              </a:rPr>
-              <a:t>, </a:t>
+              <a:t>{ 1, 1.5, 2, 2.5, </a:t>
             </a:r>
             <a:r>
               <a:rPr lang="en-US" smtClean="0">
@@ -20544,14 +20306,7 @@
                 <a:latin typeface="Consolas" panose="020B0609020204030204" pitchFamily="49" charset="0"/>
                 <a:sym typeface="Symbol" panose="05050102010706020507" pitchFamily="18" charset="2"/>
               </a:rPr>
-              <a:t> </a:t>
-            </a:r>
-            <a:r>
-              <a:rPr lang="en-US">
-                <a:latin typeface="Consolas" panose="020B0609020204030204" pitchFamily="49" charset="0"/>
-                <a:sym typeface="Symbol" panose="05050102010706020507" pitchFamily="18" charset="2"/>
-              </a:rPr>
-              <a:t>{ </a:t>
+              <a:t> { </a:t>
             </a:r>
             <a:r>
               <a:rPr lang="en-US" smtClean="0">
@@ -20595,13 +20350,7 @@
               <a:rPr lang="en-US">
                 <a:latin typeface="Consolas" panose="020B0609020204030204" pitchFamily="49" charset="0"/>
               </a:rPr>
-              <a:t>{ 1, 1.5, 2, 2.5</a:t>
-            </a:r>
-            <a:r>
-              <a:rPr lang="en-US">
-                <a:latin typeface="Consolas" panose="020B0609020204030204" pitchFamily="49" charset="0"/>
-              </a:rPr>
-              <a:t>, </a:t>
+              <a:t>{ 1, 1.5, 2, 2.5, </a:t>
             </a:r>
             <a:r>
               <a:rPr lang="en-US" smtClean="0">
@@ -20621,49 +20370,28 @@
                 <a:latin typeface="Consolas" panose="020B0609020204030204" pitchFamily="49" charset="0"/>
                 <a:sym typeface="Symbol" panose="05050102010706020507" pitchFamily="18" charset="2"/>
               </a:rPr>
-              <a:t> </a:t>
-            </a:r>
-            <a:r>
-              <a:rPr lang="en-US">
+              <a:t> { </a:t>
+            </a:r>
+            <a:r>
+              <a:rPr lang="en-US" smtClean="0">
                 <a:latin typeface="Consolas" panose="020B0609020204030204" pitchFamily="49" charset="0"/>
                 <a:sym typeface="Symbol" panose="05050102010706020507" pitchFamily="18" charset="2"/>
               </a:rPr>
-              <a:t>{ </a:t>
-            </a:r>
-            <a:r>
-              <a:rPr lang="en-US" smtClean="0">
+              <a:t>1, 2, </a:t>
+            </a:r>
+            <a:r>
+              <a:rPr lang="en-US">
                 <a:latin typeface="Consolas" panose="020B0609020204030204" pitchFamily="49" charset="0"/>
                 <a:sym typeface="Symbol" panose="05050102010706020507" pitchFamily="18" charset="2"/>
               </a:rPr>
-              <a:t>1, 2, </a:t>
-            </a:r>
-            <a:r>
-              <a:rPr lang="en-US">
+              <a:t>1.5</a:t>
+            </a:r>
+            <a:r>
+              <a:rPr lang="en-US" smtClean="0">
                 <a:latin typeface="Consolas" panose="020B0609020204030204" pitchFamily="49" charset="0"/>
                 <a:sym typeface="Symbol" panose="05050102010706020507" pitchFamily="18" charset="2"/>
               </a:rPr>
-              <a:t>1.5</a:t>
-            </a:r>
-            <a:r>
-              <a:rPr lang="en-US" smtClean="0">
-                <a:latin typeface="Consolas" panose="020B0609020204030204" pitchFamily="49" charset="0"/>
-                <a:sym typeface="Symbol" panose="05050102010706020507" pitchFamily="18" charset="2"/>
-              </a:rPr>
-              <a:t>, 2.5, </a:t>
-            </a:r>
-            <a:r>
-              <a:rPr lang="en-US" smtClean="0">
-                <a:latin typeface="Consolas" panose="020B0609020204030204" pitchFamily="49" charset="0"/>
-                <a:sym typeface="Symbol" panose="05050102010706020507" pitchFamily="18" charset="2"/>
-              </a:rPr>
-              <a:t>3</a:t>
-            </a:r>
-            <a:r>
-              <a:rPr lang="en-US" smtClean="0">
-                <a:latin typeface="Consolas" panose="020B0609020204030204" pitchFamily="49" charset="0"/>
-                <a:sym typeface="Symbol" panose="05050102010706020507" pitchFamily="18" charset="2"/>
-              </a:rPr>
-              <a:t> }</a:t>
+              <a:t>, 2.5, 3 }</a:t>
             </a:r>
             <a:endParaRPr lang="en-US" smtClean="0"/>
           </a:p>
@@ -20686,13 +20414,7 @@
               <a:rPr lang="en-US">
                 <a:latin typeface="Consolas" panose="020B0609020204030204" pitchFamily="49" charset="0"/>
               </a:rPr>
-              <a:t>{ 1, 1.5, 2, 2.5</a:t>
-            </a:r>
-            <a:r>
-              <a:rPr lang="en-US">
-                <a:latin typeface="Consolas" panose="020B0609020204030204" pitchFamily="49" charset="0"/>
-              </a:rPr>
-              <a:t>, </a:t>
+              <a:t>{ 1, 1.5, 2, 2.5, </a:t>
             </a:r>
             <a:r>
               <a:rPr lang="en-US" smtClean="0">
@@ -20730,13 +20452,7 @@
               <a:rPr lang="en-US">
                 <a:latin typeface="Consolas" panose="020B0609020204030204" pitchFamily="49" charset="0"/>
               </a:rPr>
-              <a:t>, 2.5, 1, 2</a:t>
-            </a:r>
-            <a:r>
-              <a:rPr lang="en-US">
-                <a:latin typeface="Consolas" panose="020B0609020204030204" pitchFamily="49" charset="0"/>
-              </a:rPr>
-              <a:t>, </a:t>
+              <a:t>, 2.5, 1, 2, </a:t>
             </a:r>
             <a:r>
               <a:rPr lang="en-US" smtClean="0">
@@ -20829,13 +20545,7 @@
               <a:rPr lang="en-US">
                 <a:latin typeface="Consolas" panose="020B0609020204030204" pitchFamily="49" charset="0"/>
               </a:rPr>
-              <a:t>template&lt;size_t rotval, typename </a:t>
-            </a:r>
-            <a:r>
-              <a:rPr lang="en-US">
-                <a:latin typeface="Consolas" panose="020B0609020204030204" pitchFamily="49" charset="0"/>
-              </a:rPr>
-              <a:t>Tuple</a:t>
+              <a:t>template&lt;size_t rotval, typename Tuple</a:t>
             </a:r>
             <a:r>
               <a:rPr lang="en-US" smtClean="0">
@@ -20864,13 +20574,7 @@
               <a:rPr lang="en-US">
                 <a:latin typeface="Consolas" panose="020B0609020204030204" pitchFamily="49" charset="0"/>
               </a:rPr>
-              <a:t>auto rotate_r (Tuple &amp;&amp;t</a:t>
-            </a:r>
-            <a:r>
-              <a:rPr lang="en-US">
-                <a:latin typeface="Consolas" panose="020B0609020204030204" pitchFamily="49" charset="0"/>
-              </a:rPr>
-              <a:t>) </a:t>
+              <a:t>auto rotate_r (Tuple &amp;&amp;t) </a:t>
             </a:r>
             <a:r>
               <a:rPr lang="en-US" smtClean="0">
@@ -20899,13 +20603,7 @@
               <a:rPr lang="en-US">
                 <a:latin typeface="Consolas" panose="020B0609020204030204" pitchFamily="49" charset="0"/>
               </a:rPr>
-              <a:t>constexpr size_t sz = tuple_size&lt;decay_t&lt;Tuple&gt;&gt;::</a:t>
-            </a:r>
-            <a:r>
-              <a:rPr lang="en-US">
-                <a:latin typeface="Consolas" panose="020B0609020204030204" pitchFamily="49" charset="0"/>
-              </a:rPr>
-              <a:t>value</a:t>
+              <a:t>constexpr size_t sz = tuple_size&lt;decay_t&lt;Tuple&gt;&gt;::value</a:t>
             </a:r>
             <a:r>
               <a:rPr lang="en-US" smtClean="0">
@@ -20934,13 +20632,7 @@
               <a:rPr lang="en-US">
                 <a:latin typeface="Consolas" panose="020B0609020204030204" pitchFamily="49" charset="0"/>
               </a:rPr>
-              <a:t>constexpr size_t fh_size = sz - (rotval % </a:t>
-            </a:r>
-            <a:r>
-              <a:rPr lang="en-US">
-                <a:latin typeface="Consolas" panose="020B0609020204030204" pitchFamily="49" charset="0"/>
-              </a:rPr>
-              <a:t>sz</a:t>
+              <a:t>constexpr size_t fh_size = sz - (rotval % sz</a:t>
             </a:r>
             <a:r>
               <a:rPr lang="en-US" smtClean="0">
@@ -20975,16 +20667,7 @@
                 </a:solidFill>
                 <a:latin typeface="Consolas" panose="020B0609020204030204" pitchFamily="49" charset="0"/>
               </a:rPr>
-              <a:t>auto first_half = subtuple&lt;0, fh_size&gt;(forward&lt;Tuple&gt;(</a:t>
-            </a:r>
-            <a:r>
-              <a:rPr lang="en-US">
-                <a:solidFill>
-                  <a:srgbClr val="0000FF"/>
-                </a:solidFill>
-                <a:latin typeface="Consolas" panose="020B0609020204030204" pitchFamily="49" charset="0"/>
-              </a:rPr>
-              <a:t>t</a:t>
+              <a:t>auto first_half = subtuple&lt;0, fh_size&gt;(forward&lt;Tuple&gt;(t</a:t>
             </a:r>
             <a:r>
               <a:rPr lang="en-US" smtClean="0">
@@ -21028,16 +20711,7 @@
                 </a:solidFill>
                 <a:latin typeface="Consolas" panose="020B0609020204030204" pitchFamily="49" charset="0"/>
               </a:rPr>
-              <a:t>auto second_half = subtuple&lt;fh_size, sz&gt;(forward&lt;Tuple&gt;(</a:t>
-            </a:r>
-            <a:r>
-              <a:rPr lang="en-US">
-                <a:solidFill>
-                  <a:srgbClr val="0000FF"/>
-                </a:solidFill>
-                <a:latin typeface="Consolas" panose="020B0609020204030204" pitchFamily="49" charset="0"/>
-              </a:rPr>
-              <a:t>t</a:t>
+              <a:t>auto second_half = subtuple&lt;fh_size, sz&gt;(forward&lt;Tuple&gt;(t</a:t>
             </a:r>
             <a:r>
               <a:rPr lang="en-US" smtClean="0">
@@ -21075,13 +20749,7 @@
               <a:rPr lang="en-US">
                 <a:latin typeface="Consolas" panose="020B0609020204030204" pitchFamily="49" charset="0"/>
               </a:rPr>
-              <a:t>return tuple_cat(second_half, </a:t>
-            </a:r>
-            <a:r>
-              <a:rPr lang="en-US">
-                <a:latin typeface="Consolas" panose="020B0609020204030204" pitchFamily="49" charset="0"/>
-              </a:rPr>
-              <a:t>first_half</a:t>
+              <a:t>return tuple_cat(second_half, first_half</a:t>
             </a:r>
             <a:r>
               <a:rPr lang="en-US" smtClean="0">
@@ -21151,43 +20819,31 @@
               <a:rPr lang="fr-FR">
                 <a:latin typeface="Consolas" panose="020B0609020204030204" pitchFamily="49" charset="0"/>
               </a:rPr>
-              <a:t>template&lt;typename </a:t>
+              <a:t>template&lt;typename Tuple</a:t>
+            </a:r>
+            <a:r>
+              <a:rPr lang="fr-FR" smtClean="0">
+                <a:latin typeface="Consolas" panose="020B0609020204030204" pitchFamily="49" charset="0"/>
+              </a:rPr>
+              <a:t>&gt;</a:t>
+            </a:r>
+            <a:r>
+              <a:rPr lang="ru-RU" smtClean="0">
+                <a:latin typeface="Consolas" panose="020B0609020204030204" pitchFamily="49" charset="0"/>
+              </a:rPr>
+              <a:t> </a:t>
+            </a:r>
+            <a:r>
+              <a:rPr lang="fr-FR" smtClean="0">
+                <a:latin typeface="Consolas" panose="020B0609020204030204" pitchFamily="49" charset="0"/>
+              </a:rPr>
+              <a:t>constexpr </a:t>
             </a:r>
             <a:r>
               <a:rPr lang="fr-FR">
                 <a:latin typeface="Consolas" panose="020B0609020204030204" pitchFamily="49" charset="0"/>
               </a:rPr>
-              <a:t>Tuple</a:t>
-            </a:r>
-            <a:r>
-              <a:rPr lang="fr-FR" smtClean="0">
-                <a:latin typeface="Consolas" panose="020B0609020204030204" pitchFamily="49" charset="0"/>
-              </a:rPr>
-              <a:t>&gt;</a:t>
-            </a:r>
-            <a:r>
-              <a:rPr lang="ru-RU" smtClean="0">
-                <a:latin typeface="Consolas" panose="020B0609020204030204" pitchFamily="49" charset="0"/>
-              </a:rPr>
-              <a:t> </a:t>
-            </a:r>
-            <a:r>
-              <a:rPr lang="fr-FR" smtClean="0">
-                <a:latin typeface="Consolas" panose="020B0609020204030204" pitchFamily="49" charset="0"/>
-              </a:rPr>
-              <a:t>constexpr </a:t>
-            </a:r>
-            <a:r>
-              <a:rPr lang="fr-FR">
-                <a:latin typeface="Consolas" panose="020B0609020204030204" pitchFamily="49" charset="0"/>
-              </a:rPr>
-              <a:t>auto tuple_tail(Tuple &amp;&amp;</a:t>
-            </a:r>
-            <a:r>
-              <a:rPr lang="fr-FR">
-                <a:latin typeface="Consolas" panose="020B0609020204030204" pitchFamily="49" charset="0"/>
-              </a:rPr>
-              <a:t>t</a:t>
+              <a:t>auto tuple_tail(Tuple &amp;&amp;t</a:t>
             </a:r>
             <a:r>
               <a:rPr lang="fr-FR" smtClean="0">
@@ -21325,13 +20981,7 @@
               <a:rPr lang="en-US">
                 <a:latin typeface="Consolas" panose="020B0609020204030204" pitchFamily="49" charset="0"/>
               </a:rPr>
-              <a:t>{ 1, 1.5, 2, 2.5</a:t>
-            </a:r>
-            <a:r>
-              <a:rPr lang="en-US">
-                <a:latin typeface="Consolas" panose="020B0609020204030204" pitchFamily="49" charset="0"/>
-              </a:rPr>
-              <a:t>, </a:t>
+              <a:t>{ 1, 1.5, 2, 2.5, </a:t>
             </a:r>
             <a:r>
               <a:rPr lang="en-US" smtClean="0">
@@ -21351,14 +21001,7 @@
                 <a:latin typeface="Consolas" panose="020B0609020204030204" pitchFamily="49" charset="0"/>
                 <a:sym typeface="Symbol" panose="05050102010706020507" pitchFamily="18" charset="2"/>
               </a:rPr>
-              <a:t> </a:t>
-            </a:r>
-            <a:r>
-              <a:rPr lang="en-US">
-                <a:latin typeface="Consolas" panose="020B0609020204030204" pitchFamily="49" charset="0"/>
-                <a:sym typeface="Symbol" panose="05050102010706020507" pitchFamily="18" charset="2"/>
-              </a:rPr>
-              <a:t>{ </a:t>
+              <a:t> { </a:t>
             </a:r>
             <a:r>
               <a:rPr lang="en-US" smtClean="0">
@@ -21402,13 +21045,7 @@
               <a:rPr lang="en-US">
                 <a:latin typeface="Consolas" panose="020B0609020204030204" pitchFamily="49" charset="0"/>
               </a:rPr>
-              <a:t>{ 1, 1.5, 2, 2.5</a:t>
-            </a:r>
-            <a:r>
-              <a:rPr lang="en-US">
-                <a:latin typeface="Consolas" panose="020B0609020204030204" pitchFamily="49" charset="0"/>
-              </a:rPr>
-              <a:t>, </a:t>
+              <a:t>{ 1, 1.5, 2, 2.5, </a:t>
             </a:r>
             <a:r>
               <a:rPr lang="en-US" smtClean="0">
@@ -21428,49 +21065,28 @@
                 <a:latin typeface="Consolas" panose="020B0609020204030204" pitchFamily="49" charset="0"/>
                 <a:sym typeface="Symbol" panose="05050102010706020507" pitchFamily="18" charset="2"/>
               </a:rPr>
-              <a:t> </a:t>
-            </a:r>
-            <a:r>
-              <a:rPr lang="en-US">
+              <a:t> { </a:t>
+            </a:r>
+            <a:r>
+              <a:rPr lang="en-US" smtClean="0">
                 <a:latin typeface="Consolas" panose="020B0609020204030204" pitchFamily="49" charset="0"/>
                 <a:sym typeface="Symbol" panose="05050102010706020507" pitchFamily="18" charset="2"/>
               </a:rPr>
-              <a:t>{ </a:t>
-            </a:r>
-            <a:r>
-              <a:rPr lang="en-US" smtClean="0">
+              <a:t>1, 2, </a:t>
+            </a:r>
+            <a:r>
+              <a:rPr lang="en-US">
                 <a:latin typeface="Consolas" panose="020B0609020204030204" pitchFamily="49" charset="0"/>
                 <a:sym typeface="Symbol" panose="05050102010706020507" pitchFamily="18" charset="2"/>
               </a:rPr>
-              <a:t>1, 2, </a:t>
-            </a:r>
-            <a:r>
-              <a:rPr lang="en-US">
+              <a:t>1.5</a:t>
+            </a:r>
+            <a:r>
+              <a:rPr lang="en-US" smtClean="0">
                 <a:latin typeface="Consolas" panose="020B0609020204030204" pitchFamily="49" charset="0"/>
                 <a:sym typeface="Symbol" panose="05050102010706020507" pitchFamily="18" charset="2"/>
               </a:rPr>
-              <a:t>1.5</a:t>
-            </a:r>
-            <a:r>
-              <a:rPr lang="en-US" smtClean="0">
-                <a:latin typeface="Consolas" panose="020B0609020204030204" pitchFamily="49" charset="0"/>
-                <a:sym typeface="Symbol" panose="05050102010706020507" pitchFamily="18" charset="2"/>
-              </a:rPr>
-              <a:t>, 2.5, </a:t>
-            </a:r>
-            <a:r>
-              <a:rPr lang="en-US" smtClean="0">
-                <a:latin typeface="Consolas" panose="020B0609020204030204" pitchFamily="49" charset="0"/>
-                <a:sym typeface="Symbol" panose="05050102010706020507" pitchFamily="18" charset="2"/>
-              </a:rPr>
-              <a:t>3</a:t>
-            </a:r>
-            <a:r>
-              <a:rPr lang="en-US" smtClean="0">
-                <a:latin typeface="Consolas" panose="020B0609020204030204" pitchFamily="49" charset="0"/>
-                <a:sym typeface="Symbol" panose="05050102010706020507" pitchFamily="18" charset="2"/>
-              </a:rPr>
-              <a:t> }</a:t>
+              <a:t>, 2.5, 3 }</a:t>
             </a:r>
             <a:endParaRPr lang="en-US" smtClean="0"/>
           </a:p>
@@ -21493,13 +21109,7 @@
               <a:rPr lang="en-US">
                 <a:latin typeface="Consolas" panose="020B0609020204030204" pitchFamily="49" charset="0"/>
               </a:rPr>
-              <a:t>{ 1, 1.5, 2, 2.5</a:t>
-            </a:r>
-            <a:r>
-              <a:rPr lang="en-US">
-                <a:latin typeface="Consolas" panose="020B0609020204030204" pitchFamily="49" charset="0"/>
-              </a:rPr>
-              <a:t>, </a:t>
+              <a:t>{ 1, 1.5, 2, 2.5, </a:t>
             </a:r>
             <a:r>
               <a:rPr lang="en-US" smtClean="0">
@@ -21537,13 +21147,7 @@
               <a:rPr lang="en-US">
                 <a:latin typeface="Consolas" panose="020B0609020204030204" pitchFamily="49" charset="0"/>
               </a:rPr>
-              <a:t>, 2.5, 1, 2</a:t>
-            </a:r>
-            <a:r>
-              <a:rPr lang="en-US">
-                <a:latin typeface="Consolas" panose="020B0609020204030204" pitchFamily="49" charset="0"/>
-              </a:rPr>
-              <a:t>, </a:t>
+              <a:t>, 2.5, 1, 2, </a:t>
             </a:r>
             <a:r>
               <a:rPr lang="en-US" smtClean="0">
@@ -21671,19 +21275,36 @@
               <a:rPr lang="en-US" sz="2000">
                 <a:latin typeface="Consolas" panose="020B0609020204030204" pitchFamily="49" charset="0"/>
               </a:rPr>
-              <a:t>typename </a:t>
+              <a:t>typename Tuple</a:t>
+            </a:r>
+            <a:r>
+              <a:rPr lang="en-US" sz="2000" smtClean="0">
+                <a:latin typeface="Consolas" panose="020B0609020204030204" pitchFamily="49" charset="0"/>
+              </a:rPr>
+              <a:t>&gt;</a:t>
+            </a:r>
+            <a:br>
+              <a:rPr lang="en-US" sz="2000" smtClean="0">
+                <a:latin typeface="Consolas" panose="020B0609020204030204" pitchFamily="49" charset="0"/>
+              </a:rPr>
+            </a:br>
+            <a:r>
+              <a:rPr lang="en-US" sz="2000" smtClean="0">
+                <a:latin typeface="Consolas" panose="020B0609020204030204" pitchFamily="49" charset="0"/>
+              </a:rPr>
+              <a:t>constexpr </a:t>
             </a:r>
             <a:r>
               <a:rPr lang="en-US" sz="2000">
                 <a:latin typeface="Consolas" panose="020B0609020204030204" pitchFamily="49" charset="0"/>
               </a:rPr>
-              <a:t>Tuple</a:t>
+              <a:t>auto swap_elts (Tuple &amp;&amp;t) </a:t>
             </a:r>
             <a:r>
               <a:rPr lang="en-US" sz="2000" smtClean="0">
                 <a:latin typeface="Consolas" panose="020B0609020204030204" pitchFamily="49" charset="0"/>
               </a:rPr>
-              <a:t>&gt;</a:t>
+              <a:t>{</a:t>
             </a:r>
             <a:br>
               <a:rPr lang="en-US" sz="2000" smtClean="0">
@@ -21694,48 +21315,13 @@
               <a:rPr lang="en-US" sz="2000" smtClean="0">
                 <a:latin typeface="Consolas" panose="020B0609020204030204" pitchFamily="49" charset="0"/>
               </a:rPr>
-              <a:t>constexpr </a:t>
+              <a:t>  </a:t>
             </a:r>
             <a:r>
               <a:rPr lang="en-US" sz="2000">
                 <a:latin typeface="Consolas" panose="020B0609020204030204" pitchFamily="49" charset="0"/>
               </a:rPr>
-              <a:t>auto swap_elts (Tuple &amp;&amp;t</a:t>
-            </a:r>
-            <a:r>
-              <a:rPr lang="en-US" sz="2000">
-                <a:latin typeface="Consolas" panose="020B0609020204030204" pitchFamily="49" charset="0"/>
-              </a:rPr>
-              <a:t>) </a:t>
-            </a:r>
-            <a:r>
-              <a:rPr lang="en-US" sz="2000" smtClean="0">
-                <a:latin typeface="Consolas" panose="020B0609020204030204" pitchFamily="49" charset="0"/>
-              </a:rPr>
-              <a:t>{</a:t>
-            </a:r>
-            <a:br>
-              <a:rPr lang="en-US" sz="2000" smtClean="0">
-                <a:latin typeface="Consolas" panose="020B0609020204030204" pitchFamily="49" charset="0"/>
-              </a:rPr>
-            </a:br>
-            <a:r>
-              <a:rPr lang="en-US" sz="2000" smtClean="0">
-                <a:latin typeface="Consolas" panose="020B0609020204030204" pitchFamily="49" charset="0"/>
-              </a:rPr>
-              <a:t>  </a:t>
-            </a:r>
-            <a:r>
-              <a:rPr lang="en-US" sz="2000">
-                <a:latin typeface="Consolas" panose="020B0609020204030204" pitchFamily="49" charset="0"/>
-              </a:rPr>
-              <a:t>constexpr size_t sz = tuple_size&lt;decay_t&lt;Tuple&gt;&gt;::</a:t>
-            </a:r>
-            <a:r>
-              <a:rPr lang="en-US" sz="2000">
-                <a:latin typeface="Consolas" panose="020B0609020204030204" pitchFamily="49" charset="0"/>
-              </a:rPr>
-              <a:t>value</a:t>
+              <a:t>constexpr size_t sz = tuple_size&lt;decay_t&lt;Tuple&gt;&gt;::value</a:t>
             </a:r>
             <a:r>
               <a:rPr lang="en-US" sz="2000" smtClean="0">
@@ -21835,19 +21421,36 @@
               <a:rPr lang="en-US" sz="2000">
                 <a:latin typeface="Consolas" panose="020B0609020204030204" pitchFamily="49" charset="0"/>
               </a:rPr>
-              <a:t>auto&amp;&amp; nth = make_tuple(get&lt;N&gt;(forward&lt;Tuple&gt;(</a:t>
+              <a:t>auto&amp;&amp; nth = make_tuple(get&lt;N</a:t>
+            </a:r>
+            <a:r>
+              <a:rPr lang="en-US" sz="2000" smtClean="0">
+                <a:latin typeface="Consolas" panose="020B0609020204030204" pitchFamily="49" charset="0"/>
+              </a:rPr>
+              <a:t>&gt;(t));</a:t>
+            </a:r>
+            <a:br>
+              <a:rPr lang="en-US" sz="2000" smtClean="0">
+                <a:latin typeface="Consolas" panose="020B0609020204030204" pitchFamily="49" charset="0"/>
+              </a:rPr>
+            </a:br>
+            <a:r>
+              <a:rPr lang="en-US" sz="2000" smtClean="0">
+                <a:latin typeface="Consolas" panose="020B0609020204030204" pitchFamily="49" charset="0"/>
+              </a:rPr>
+              <a:t>  </a:t>
             </a:r>
             <a:r>
               <a:rPr lang="en-US" sz="2000">
                 <a:latin typeface="Consolas" panose="020B0609020204030204" pitchFamily="49" charset="0"/>
               </a:rPr>
-              <a:t>t</a:t>
+              <a:t>auto&amp;&amp; mth = make_tuple(get&lt;M</a:t>
             </a:r>
             <a:r>
               <a:rPr lang="en-US" sz="2000" smtClean="0">
                 <a:latin typeface="Consolas" panose="020B0609020204030204" pitchFamily="49" charset="0"/>
               </a:rPr>
-              <a:t>)));</a:t>
+              <a:t>&gt;(t));</a:t>
             </a:r>
             <a:br>
               <a:rPr lang="en-US" sz="2000" smtClean="0">
@@ -21864,42 +21467,7 @@
               <a:rPr lang="en-US" sz="2000">
                 <a:latin typeface="Consolas" panose="020B0609020204030204" pitchFamily="49" charset="0"/>
               </a:rPr>
-              <a:t>auto&amp;&amp; mth = make_tuple(get&lt;M&gt;(forward&lt;Tuple&gt;(</a:t>
-            </a:r>
-            <a:r>
-              <a:rPr lang="en-US" sz="2000">
-                <a:latin typeface="Consolas" panose="020B0609020204030204" pitchFamily="49" charset="0"/>
-              </a:rPr>
-              <a:t>t</a:t>
-            </a:r>
-            <a:r>
-              <a:rPr lang="en-US" sz="2000" smtClean="0">
-                <a:latin typeface="Consolas" panose="020B0609020204030204" pitchFamily="49" charset="0"/>
-              </a:rPr>
-              <a:t>)));</a:t>
-            </a:r>
-            <a:br>
-              <a:rPr lang="en-US" sz="2000" smtClean="0">
-                <a:latin typeface="Consolas" panose="020B0609020204030204" pitchFamily="49" charset="0"/>
-              </a:rPr>
-            </a:br>
-            <a:r>
-              <a:rPr lang="en-US" sz="2000" smtClean="0">
-                <a:latin typeface="Consolas" panose="020B0609020204030204" pitchFamily="49" charset="0"/>
-              </a:rPr>
-              <a:t>  </a:t>
-            </a:r>
-            <a:r>
-              <a:rPr lang="en-US" sz="2000">
-                <a:latin typeface="Consolas" panose="020B0609020204030204" pitchFamily="49" charset="0"/>
-              </a:rPr>
-              <a:t>auto&amp;&amp; tmp1 = </a:t>
-            </a:r>
-            <a:r>
-              <a:rPr lang="en-US" sz="2000">
-                <a:latin typeface="Consolas" panose="020B0609020204030204" pitchFamily="49" charset="0"/>
-              </a:rPr>
-              <a:t>tuple_cat(mth</a:t>
+              <a:t>auto&amp;&amp; tmp1 = tuple_cat(mth</a:t>
             </a:r>
             <a:r>
               <a:rPr lang="en-US" sz="2000" smtClean="0">
@@ -21934,7 +21502,39 @@
                 </a:solidFill>
                 <a:latin typeface="Consolas" panose="020B0609020204030204" pitchFamily="49" charset="0"/>
               </a:rPr>
-              <a:t>&gt;(forward&lt;Tuple&gt;(</a:t>
+              <a:t>&gt;(forward&lt;Tuple&gt;(t</a:t>
+            </a:r>
+            <a:r>
+              <a:rPr lang="en-US" sz="2000" smtClean="0">
+                <a:solidFill>
+                  <a:srgbClr val="0000FF"/>
+                </a:solidFill>
+                <a:latin typeface="Consolas" panose="020B0609020204030204" pitchFamily="49" charset="0"/>
+              </a:rPr>
+              <a:t>)))</a:t>
+            </a:r>
+            <a:r>
+              <a:rPr lang="en-US" sz="2000" smtClean="0">
+                <a:latin typeface="Consolas" panose="020B0609020204030204" pitchFamily="49" charset="0"/>
+              </a:rPr>
+              <a:t>);</a:t>
+            </a:r>
+            <a:br>
+              <a:rPr lang="en-US" sz="2000" smtClean="0">
+                <a:latin typeface="Consolas" panose="020B0609020204030204" pitchFamily="49" charset="0"/>
+              </a:rPr>
+            </a:br>
+            <a:r>
+              <a:rPr lang="en-US" sz="2000" smtClean="0">
+                <a:latin typeface="Consolas" panose="020B0609020204030204" pitchFamily="49" charset="0"/>
+              </a:rPr>
+              <a:t>  </a:t>
+            </a:r>
+            <a:r>
+              <a:rPr lang="en-US" sz="2000">
+                <a:latin typeface="Consolas" panose="020B0609020204030204" pitchFamily="49" charset="0"/>
+              </a:rPr>
+              <a:t>auto&amp;&amp; tmp2 = tuple_cat(nth, tuple_tail(</a:t>
             </a:r>
             <a:r>
               <a:rPr lang="en-US" sz="2000">
@@ -21943,7 +21543,7 @@
                 </a:solidFill>
                 <a:latin typeface="Consolas" panose="020B0609020204030204" pitchFamily="49" charset="0"/>
               </a:rPr>
-              <a:t>t</a:t>
+              <a:t>rotate_l&lt;M-N&gt;(tmp1</a:t>
             </a:r>
             <a:r>
               <a:rPr lang="en-US" sz="2000" smtClean="0">
@@ -21952,7 +21552,7 @@
                 </a:solidFill>
                 <a:latin typeface="Consolas" panose="020B0609020204030204" pitchFamily="49" charset="0"/>
               </a:rPr>
-              <a:t>)))</a:t>
+              <a:t>))</a:t>
             </a:r>
             <a:r>
               <a:rPr lang="en-US" sz="2000" smtClean="0">
@@ -21975,7 +21575,7 @@
               <a:rPr lang="en-US" sz="2000">
                 <a:latin typeface="Consolas" panose="020B0609020204030204" pitchFamily="49" charset="0"/>
               </a:rPr>
-              <a:t>auto&amp;&amp; tmp2 = tuple_cat(nth, tuple_tail(</a:t>
+              <a:t>return </a:t>
             </a:r>
             <a:r>
               <a:rPr lang="en-US" sz="2000">
@@ -21984,66 +21584,7 @@
                 </a:solidFill>
                 <a:latin typeface="Consolas" panose="020B0609020204030204" pitchFamily="49" charset="0"/>
               </a:rPr>
-              <a:t>rotate_l&lt;M-N&gt;(</a:t>
-            </a:r>
-            <a:r>
-              <a:rPr lang="en-US" sz="2000">
-                <a:solidFill>
-                  <a:srgbClr val="0000FF"/>
-                </a:solidFill>
-                <a:latin typeface="Consolas" panose="020B0609020204030204" pitchFamily="49" charset="0"/>
-              </a:rPr>
-              <a:t>tmp1</a:t>
-            </a:r>
-            <a:r>
-              <a:rPr lang="en-US" sz="2000" smtClean="0">
-                <a:solidFill>
-                  <a:srgbClr val="0000FF"/>
-                </a:solidFill>
-                <a:latin typeface="Consolas" panose="020B0609020204030204" pitchFamily="49" charset="0"/>
-              </a:rPr>
-              <a:t>))</a:t>
-            </a:r>
-            <a:r>
-              <a:rPr lang="en-US" sz="2000" smtClean="0">
-                <a:latin typeface="Consolas" panose="020B0609020204030204" pitchFamily="49" charset="0"/>
-              </a:rPr>
-              <a:t>);</a:t>
-            </a:r>
-            <a:br>
-              <a:rPr lang="en-US" sz="2000" smtClean="0">
-                <a:latin typeface="Consolas" panose="020B0609020204030204" pitchFamily="49" charset="0"/>
-              </a:rPr>
-            </a:br>
-            <a:r>
-              <a:rPr lang="en-US" sz="2000" smtClean="0">
-                <a:latin typeface="Consolas" panose="020B0609020204030204" pitchFamily="49" charset="0"/>
-              </a:rPr>
-              <a:t>  </a:t>
-            </a:r>
-            <a:r>
-              <a:rPr lang="en-US" sz="2000">
-                <a:latin typeface="Consolas" panose="020B0609020204030204" pitchFamily="49" charset="0"/>
-              </a:rPr>
-              <a:t>return </a:t>
-            </a:r>
-            <a:r>
-              <a:rPr lang="en-US" sz="2000">
-                <a:solidFill>
-                  <a:srgbClr val="0000FF"/>
-                </a:solidFill>
-                <a:latin typeface="Consolas" panose="020B0609020204030204" pitchFamily="49" charset="0"/>
-              </a:rPr>
-              <a:t>rotate_r&lt;M&gt;(</a:t>
-            </a:r>
-            <a:r>
-              <a:rPr lang="en-US" sz="2000">
-                <a:solidFill>
-                  <a:srgbClr val="0000FF"/>
-                </a:solidFill>
-                <a:latin typeface="Consolas" panose="020B0609020204030204" pitchFamily="49" charset="0"/>
-              </a:rPr>
-              <a:t>tmp2</a:t>
+              <a:t>rotate_r&lt;M&gt;(tmp2</a:t>
             </a:r>
             <a:r>
               <a:rPr lang="en-US" sz="2000" smtClean="0">
@@ -22228,13 +21769,7 @@
               <a:rPr lang="en-US">
                 <a:latin typeface="Consolas" panose="020B0609020204030204" pitchFamily="49" charset="0"/>
               </a:rPr>
-              <a:t>{ 1, 1.5, 2, 2.5</a:t>
-            </a:r>
-            <a:r>
-              <a:rPr lang="en-US">
-                <a:latin typeface="Consolas" panose="020B0609020204030204" pitchFamily="49" charset="0"/>
-              </a:rPr>
-              <a:t>, </a:t>
+              <a:t>{ 1, 1.5, 2, 2.5, </a:t>
             </a:r>
             <a:r>
               <a:rPr lang="en-US" smtClean="0">
@@ -22254,14 +21789,7 @@
                 <a:latin typeface="Consolas" panose="020B0609020204030204" pitchFamily="49" charset="0"/>
                 <a:sym typeface="Symbol" panose="05050102010706020507" pitchFamily="18" charset="2"/>
               </a:rPr>
-              <a:t> </a:t>
-            </a:r>
-            <a:r>
-              <a:rPr lang="en-US">
-                <a:latin typeface="Consolas" panose="020B0609020204030204" pitchFamily="49" charset="0"/>
-                <a:sym typeface="Symbol" panose="05050102010706020507" pitchFamily="18" charset="2"/>
-              </a:rPr>
-              <a:t>{ </a:t>
+              <a:t> { </a:t>
             </a:r>
             <a:r>
               <a:rPr lang="en-US" smtClean="0">
@@ -22305,13 +21833,7 @@
               <a:rPr lang="en-US">
                 <a:latin typeface="Consolas" panose="020B0609020204030204" pitchFamily="49" charset="0"/>
               </a:rPr>
-              <a:t>{ 1, 1.5, 2, 2.5</a:t>
-            </a:r>
-            <a:r>
-              <a:rPr lang="en-US">
-                <a:latin typeface="Consolas" panose="020B0609020204030204" pitchFamily="49" charset="0"/>
-              </a:rPr>
-              <a:t>, </a:t>
+              <a:t>{ 1, 1.5, 2, 2.5, </a:t>
             </a:r>
             <a:r>
               <a:rPr lang="en-US" smtClean="0">
@@ -22331,49 +21853,28 @@
                 <a:latin typeface="Consolas" panose="020B0609020204030204" pitchFamily="49" charset="0"/>
                 <a:sym typeface="Symbol" panose="05050102010706020507" pitchFamily="18" charset="2"/>
               </a:rPr>
-              <a:t> </a:t>
-            </a:r>
-            <a:r>
-              <a:rPr lang="en-US">
+              <a:t> { </a:t>
+            </a:r>
+            <a:r>
+              <a:rPr lang="en-US" smtClean="0">
                 <a:latin typeface="Consolas" panose="020B0609020204030204" pitchFamily="49" charset="0"/>
                 <a:sym typeface="Symbol" panose="05050102010706020507" pitchFamily="18" charset="2"/>
               </a:rPr>
-              <a:t>{ </a:t>
-            </a:r>
-            <a:r>
-              <a:rPr lang="en-US" smtClean="0">
+              <a:t>1, 2, </a:t>
+            </a:r>
+            <a:r>
+              <a:rPr lang="en-US">
                 <a:latin typeface="Consolas" panose="020B0609020204030204" pitchFamily="49" charset="0"/>
                 <a:sym typeface="Symbol" panose="05050102010706020507" pitchFamily="18" charset="2"/>
               </a:rPr>
-              <a:t>1, 2, </a:t>
-            </a:r>
-            <a:r>
-              <a:rPr lang="en-US">
+              <a:t>1.5</a:t>
+            </a:r>
+            <a:r>
+              <a:rPr lang="en-US" smtClean="0">
                 <a:latin typeface="Consolas" panose="020B0609020204030204" pitchFamily="49" charset="0"/>
                 <a:sym typeface="Symbol" panose="05050102010706020507" pitchFamily="18" charset="2"/>
               </a:rPr>
-              <a:t>1.5</a:t>
-            </a:r>
-            <a:r>
-              <a:rPr lang="en-US" smtClean="0">
-                <a:latin typeface="Consolas" panose="020B0609020204030204" pitchFamily="49" charset="0"/>
-                <a:sym typeface="Symbol" panose="05050102010706020507" pitchFamily="18" charset="2"/>
-              </a:rPr>
-              <a:t>, 2.5, </a:t>
-            </a:r>
-            <a:r>
-              <a:rPr lang="en-US" smtClean="0">
-                <a:latin typeface="Consolas" panose="020B0609020204030204" pitchFamily="49" charset="0"/>
-                <a:sym typeface="Symbol" panose="05050102010706020507" pitchFamily="18" charset="2"/>
-              </a:rPr>
-              <a:t>3</a:t>
-            </a:r>
-            <a:r>
-              <a:rPr lang="en-US" smtClean="0">
-                <a:latin typeface="Consolas" panose="020B0609020204030204" pitchFamily="49" charset="0"/>
-                <a:sym typeface="Symbol" panose="05050102010706020507" pitchFamily="18" charset="2"/>
-              </a:rPr>
-              <a:t> }</a:t>
+              <a:t>, 2.5, 3 }</a:t>
             </a:r>
             <a:endParaRPr lang="en-US" smtClean="0"/>
           </a:p>
@@ -22396,13 +21897,7 @@
               <a:rPr lang="en-US">
                 <a:latin typeface="Consolas" panose="020B0609020204030204" pitchFamily="49" charset="0"/>
               </a:rPr>
-              <a:t>{ 1, 1.5, 2, 2.5</a:t>
-            </a:r>
-            <a:r>
-              <a:rPr lang="en-US">
-                <a:latin typeface="Consolas" panose="020B0609020204030204" pitchFamily="49" charset="0"/>
-              </a:rPr>
-              <a:t>, </a:t>
+              <a:t>{ 1, 1.5, 2, 2.5, </a:t>
             </a:r>
             <a:r>
               <a:rPr lang="en-US" smtClean="0">
@@ -22440,13 +21935,7 @@
               <a:rPr lang="en-US">
                 <a:latin typeface="Consolas" panose="020B0609020204030204" pitchFamily="49" charset="0"/>
               </a:rPr>
-              <a:t>, 2.5, 1, 2</a:t>
-            </a:r>
-            <a:r>
-              <a:rPr lang="en-US">
-                <a:latin typeface="Consolas" panose="020B0609020204030204" pitchFamily="49" charset="0"/>
-              </a:rPr>
-              <a:t>, </a:t>
+              <a:t>, 2.5, 1, 2, </a:t>
             </a:r>
             <a:r>
               <a:rPr lang="en-US" smtClean="0">
@@ -22620,13 +22109,62 @@
                 <a:latin typeface="Consolas" panose="020B0609020204030204" pitchFamily="49" charset="0"/>
                 <a:sym typeface="Symbol" panose="05050102010706020507" pitchFamily="18" charset="2"/>
               </a:rPr>
+              <a:t> </a:t>
+            </a:r>
+            <a:r>
+              <a:rPr lang="ru-RU">
+                <a:latin typeface="Consolas" panose="020B0609020204030204" pitchFamily="49" charset="0"/>
+              </a:rPr>
               <a:t> </a:t>
             </a:r>
             <a:r>
+              <a:rPr lang="en-US" smtClean="0">
+                <a:latin typeface="Consolas" panose="020B0609020204030204" pitchFamily="49" charset="0"/>
+              </a:rPr>
+              <a:t>(2, 3)</a:t>
+            </a:r>
+            <a:r>
+              <a:rPr lang="ru-RU" smtClean="0">
+                <a:latin typeface="Consolas" panose="020B0609020204030204" pitchFamily="49" charset="0"/>
+              </a:rPr>
+              <a:t> </a:t>
+            </a:r>
+            <a:r>
               <a:rPr lang="ru-RU">
                 <a:latin typeface="Consolas" panose="020B0609020204030204" pitchFamily="49" charset="0"/>
                 <a:sym typeface="Symbol" panose="05050102010706020507" pitchFamily="18" charset="2"/>
               </a:rPr>
+              <a:t> </a:t>
+            </a:r>
+            <a:r>
+              <a:rPr lang="en-US" smtClean="0">
+                <a:latin typeface="Consolas" panose="020B0609020204030204" pitchFamily="49" charset="0"/>
+                <a:sym typeface="Symbol" panose="05050102010706020507" pitchFamily="18" charset="2"/>
+              </a:rPr>
+              <a:t>{ b, c, a }</a:t>
+            </a:r>
+          </a:p>
+          <a:p>
+            <a:pPr marL="45720" indent="0">
+              <a:buNone/>
+            </a:pPr>
+            <a:r>
+              <a:rPr lang="en-US">
+                <a:latin typeface="Consolas" panose="020B0609020204030204" pitchFamily="49" charset="0"/>
+              </a:rPr>
+              <a:t>{ a, b, c </a:t>
+            </a:r>
+            <a:r>
+              <a:rPr lang="en-US" smtClean="0">
+                <a:latin typeface="Consolas" panose="020B0609020204030204" pitchFamily="49" charset="0"/>
+              </a:rPr>
+              <a:t>} </a:t>
+            </a:r>
+            <a:r>
+              <a:rPr lang="ru-RU">
+                <a:latin typeface="Consolas" panose="020B0609020204030204" pitchFamily="49" charset="0"/>
+                <a:sym typeface="Symbol" panose="05050102010706020507" pitchFamily="18" charset="2"/>
+              </a:rPr>
               <a:t></a:t>
             </a:r>
             <a:r>
@@ -22636,112 +22174,37 @@
               <a:t> </a:t>
             </a:r>
             <a:r>
-              <a:rPr lang="en-US" smtClean="0">
-                <a:latin typeface="Consolas" panose="020B0609020204030204" pitchFamily="49" charset="0"/>
-              </a:rPr>
-              <a:t>(2, 3)</a:t>
+              <a:rPr lang="en-US">
+                <a:latin typeface="Consolas" panose="020B0609020204030204" pitchFamily="49" charset="0"/>
+              </a:rPr>
+              <a:t>(1, 2</a:t>
+            </a:r>
+            <a:r>
+              <a:rPr lang="en-US" smtClean="0">
+                <a:latin typeface="Consolas" panose="020B0609020204030204" pitchFamily="49" charset="0"/>
+              </a:rPr>
+              <a:t>) * (2, 3) </a:t>
             </a:r>
             <a:r>
               <a:rPr lang="ru-RU" smtClean="0">
                 <a:latin typeface="Consolas" panose="020B0609020204030204" pitchFamily="49" charset="0"/>
+                <a:sym typeface="Symbol" panose="05050102010706020507" pitchFamily="18" charset="2"/>
+              </a:rPr>
+              <a:t></a:t>
+            </a:r>
+            <a:r>
+              <a:rPr lang="en-US" smtClean="0">
+                <a:latin typeface="Consolas" panose="020B0609020204030204" pitchFamily="49" charset="0"/>
+                <a:sym typeface="Symbol" panose="05050102010706020507" pitchFamily="18" charset="2"/>
               </a:rPr>
               <a:t> </a:t>
             </a:r>
             <a:r>
-              <a:rPr lang="ru-RU">
+              <a:rPr lang="en-US">
                 <a:latin typeface="Consolas" panose="020B0609020204030204" pitchFamily="49" charset="0"/>
                 <a:sym typeface="Symbol" panose="05050102010706020507" pitchFamily="18" charset="2"/>
               </a:rPr>
-              <a:t> </a:t>
-            </a:r>
-            <a:r>
-              <a:rPr lang="en-US" smtClean="0">
-                <a:latin typeface="Consolas" panose="020B0609020204030204" pitchFamily="49" charset="0"/>
-                <a:sym typeface="Symbol" panose="05050102010706020507" pitchFamily="18" charset="2"/>
-              </a:rPr>
-              <a:t>{ b, c, a }</a:t>
-            </a:r>
-          </a:p>
-          <a:p>
-            <a:pPr marL="45720" indent="0">
-              <a:buNone/>
-            </a:pPr>
-            <a:r>
-              <a:rPr lang="en-US">
-                <a:latin typeface="Consolas" panose="020B0609020204030204" pitchFamily="49" charset="0"/>
-              </a:rPr>
-              <a:t>{ a, b, </a:t>
-            </a:r>
-            <a:r>
-              <a:rPr lang="en-US">
-                <a:latin typeface="Consolas" panose="020B0609020204030204" pitchFamily="49" charset="0"/>
-              </a:rPr>
-              <a:t>c </a:t>
-            </a:r>
-            <a:r>
-              <a:rPr lang="en-US" smtClean="0">
-                <a:latin typeface="Consolas" panose="020B0609020204030204" pitchFamily="49" charset="0"/>
-              </a:rPr>
-              <a:t>} </a:t>
-            </a:r>
-            <a:r>
-              <a:rPr lang="ru-RU">
-                <a:latin typeface="Consolas" panose="020B0609020204030204" pitchFamily="49" charset="0"/>
-                <a:sym typeface="Symbol" panose="05050102010706020507" pitchFamily="18" charset="2"/>
-              </a:rPr>
-              <a:t></a:t>
-            </a:r>
-            <a:r>
-              <a:rPr lang="ru-RU">
-                <a:latin typeface="Consolas" panose="020B0609020204030204" pitchFamily="49" charset="0"/>
-              </a:rPr>
-              <a:t> </a:t>
-            </a:r>
-            <a:r>
-              <a:rPr lang="en-US">
-                <a:latin typeface="Consolas" panose="020B0609020204030204" pitchFamily="49" charset="0"/>
-              </a:rPr>
-              <a:t>(1, </a:t>
-            </a:r>
-            <a:r>
-              <a:rPr lang="en-US">
-                <a:latin typeface="Consolas" panose="020B0609020204030204" pitchFamily="49" charset="0"/>
-              </a:rPr>
-              <a:t>2</a:t>
-            </a:r>
-            <a:r>
-              <a:rPr lang="en-US" smtClean="0">
-                <a:latin typeface="Consolas" panose="020B0609020204030204" pitchFamily="49" charset="0"/>
-              </a:rPr>
-              <a:t>) * (2, 3) </a:t>
-            </a:r>
-            <a:r>
-              <a:rPr lang="ru-RU" smtClean="0">
-                <a:latin typeface="Consolas" panose="020B0609020204030204" pitchFamily="49" charset="0"/>
-                <a:sym typeface="Symbol" panose="05050102010706020507" pitchFamily="18" charset="2"/>
-              </a:rPr>
-              <a:t></a:t>
-            </a:r>
-            <a:r>
-              <a:rPr lang="en-US" smtClean="0">
-                <a:latin typeface="Consolas" panose="020B0609020204030204" pitchFamily="49" charset="0"/>
-                <a:sym typeface="Symbol" panose="05050102010706020507" pitchFamily="18" charset="2"/>
-              </a:rPr>
-              <a:t> </a:t>
-            </a:r>
-            <a:r>
-              <a:rPr lang="en-US">
-                <a:latin typeface="Consolas" panose="020B0609020204030204" pitchFamily="49" charset="0"/>
-                <a:sym typeface="Symbol" panose="05050102010706020507" pitchFamily="18" charset="2"/>
-              </a:rPr>
-              <a:t>{ b, c, </a:t>
-            </a:r>
-            <a:r>
-              <a:rPr lang="en-US">
-                <a:latin typeface="Consolas" panose="020B0609020204030204" pitchFamily="49" charset="0"/>
-                <a:sym typeface="Symbol" panose="05050102010706020507" pitchFamily="18" charset="2"/>
-              </a:rPr>
-              <a:t>a </a:t>
+              <a:t>{ b, c, a </a:t>
             </a:r>
             <a:r>
               <a:rPr lang="en-US" smtClean="0">
@@ -22771,16 +22234,7 @@
                 </a:solidFill>
                 <a:latin typeface="Consolas" panose="020B0609020204030204" pitchFamily="49" charset="0"/>
               </a:rPr>
-              <a:t>1, 2) * (2, 3) </a:t>
-            </a:r>
-            <a:r>
-              <a:rPr lang="en-US">
-                <a:solidFill>
-                  <a:srgbClr val="0000FF"/>
-                </a:solidFill>
-                <a:latin typeface="Consolas" panose="020B0609020204030204" pitchFamily="49" charset="0"/>
-              </a:rPr>
-              <a:t>== </a:t>
+              <a:t>1, 2) * (2, 3) == </a:t>
             </a:r>
             <a:r>
               <a:rPr lang="ru-RU" smtClean="0">
@@ -22848,13 +22302,7 @@
               <a:rPr lang="en-US">
                 <a:latin typeface="Consolas" panose="020B0609020204030204" pitchFamily="49" charset="0"/>
               </a:rPr>
-              <a:t>(1</a:t>
-            </a:r>
-            <a:r>
-              <a:rPr lang="en-US">
-                <a:latin typeface="Consolas" panose="020B0609020204030204" pitchFamily="49" charset="0"/>
-              </a:rPr>
-              <a:t>, </a:t>
+              <a:t>(1, </a:t>
             </a:r>
             <a:r>
               <a:rPr lang="en-US" smtClean="0">
@@ -23048,13 +22496,62 @@
                 <a:latin typeface="Consolas" panose="020B0609020204030204" pitchFamily="49" charset="0"/>
                 <a:sym typeface="Symbol" panose="05050102010706020507" pitchFamily="18" charset="2"/>
               </a:rPr>
+              <a:t> </a:t>
+            </a:r>
+            <a:r>
+              <a:rPr lang="ru-RU">
+                <a:latin typeface="Consolas" panose="020B0609020204030204" pitchFamily="49" charset="0"/>
+              </a:rPr>
               <a:t> </a:t>
             </a:r>
             <a:r>
+              <a:rPr lang="en-US" smtClean="0">
+                <a:latin typeface="Consolas" panose="020B0609020204030204" pitchFamily="49" charset="0"/>
+              </a:rPr>
+              <a:t>(2, 3)</a:t>
+            </a:r>
+            <a:r>
+              <a:rPr lang="ru-RU" smtClean="0">
+                <a:latin typeface="Consolas" panose="020B0609020204030204" pitchFamily="49" charset="0"/>
+              </a:rPr>
+              <a:t> </a:t>
+            </a:r>
+            <a:r>
               <a:rPr lang="ru-RU">
                 <a:latin typeface="Consolas" panose="020B0609020204030204" pitchFamily="49" charset="0"/>
                 <a:sym typeface="Symbol" panose="05050102010706020507" pitchFamily="18" charset="2"/>
               </a:rPr>
+              <a:t> </a:t>
+            </a:r>
+            <a:r>
+              <a:rPr lang="en-US" smtClean="0">
+                <a:latin typeface="Consolas" panose="020B0609020204030204" pitchFamily="49" charset="0"/>
+                <a:sym typeface="Symbol" panose="05050102010706020507" pitchFamily="18" charset="2"/>
+              </a:rPr>
+              <a:t>{ b, c, a }</a:t>
+            </a:r>
+          </a:p>
+          <a:p>
+            <a:pPr marL="45720" indent="0">
+              <a:buNone/>
+            </a:pPr>
+            <a:r>
+              <a:rPr lang="en-US">
+                <a:latin typeface="Consolas" panose="020B0609020204030204" pitchFamily="49" charset="0"/>
+              </a:rPr>
+              <a:t>{ a, b, c </a:t>
+            </a:r>
+            <a:r>
+              <a:rPr lang="en-US" smtClean="0">
+                <a:latin typeface="Consolas" panose="020B0609020204030204" pitchFamily="49" charset="0"/>
+              </a:rPr>
+              <a:t>} </a:t>
+            </a:r>
+            <a:r>
+              <a:rPr lang="ru-RU">
+                <a:latin typeface="Consolas" panose="020B0609020204030204" pitchFamily="49" charset="0"/>
+                <a:sym typeface="Symbol" panose="05050102010706020507" pitchFamily="18" charset="2"/>
+              </a:rPr>
               <a:t></a:t>
             </a:r>
             <a:r>
@@ -23064,30 +22561,44 @@
               <a:t> </a:t>
             </a:r>
             <a:r>
-              <a:rPr lang="en-US" smtClean="0">
-                <a:latin typeface="Consolas" panose="020B0609020204030204" pitchFamily="49" charset="0"/>
-              </a:rPr>
-              <a:t>(2, 3)</a:t>
+              <a:rPr lang="en-US">
+                <a:latin typeface="Consolas" panose="020B0609020204030204" pitchFamily="49" charset="0"/>
+              </a:rPr>
+              <a:t>(1, 2</a:t>
+            </a:r>
+            <a:r>
+              <a:rPr lang="en-US" smtClean="0">
+                <a:latin typeface="Consolas" panose="020B0609020204030204" pitchFamily="49" charset="0"/>
+              </a:rPr>
+              <a:t>) * (2, 3) </a:t>
             </a:r>
             <a:r>
               <a:rPr lang="ru-RU" smtClean="0">
                 <a:latin typeface="Consolas" panose="020B0609020204030204" pitchFamily="49" charset="0"/>
+                <a:sym typeface="Symbol" panose="05050102010706020507" pitchFamily="18" charset="2"/>
+              </a:rPr>
+              <a:t></a:t>
+            </a:r>
+            <a:r>
+              <a:rPr lang="en-US" smtClean="0">
+                <a:latin typeface="Consolas" panose="020B0609020204030204" pitchFamily="49" charset="0"/>
+                <a:sym typeface="Symbol" panose="05050102010706020507" pitchFamily="18" charset="2"/>
               </a:rPr>
               <a:t> </a:t>
             </a:r>
             <a:r>
-              <a:rPr lang="ru-RU">
+              <a:rPr lang="en-US">
                 <a:latin typeface="Consolas" panose="020B0609020204030204" pitchFamily="49" charset="0"/>
                 <a:sym typeface="Symbol" panose="05050102010706020507" pitchFamily="18" charset="2"/>
               </a:rPr>
-              <a:t> </a:t>
+              <a:t>{ b, c, a </a:t>
             </a:r>
             <a:r>
               <a:rPr lang="en-US" smtClean="0">
                 <a:latin typeface="Consolas" panose="020B0609020204030204" pitchFamily="49" charset="0"/>
                 <a:sym typeface="Symbol" panose="05050102010706020507" pitchFamily="18" charset="2"/>
               </a:rPr>
-              <a:t>{ b, c, a }</a:t>
+              <a:t>}</a:t>
             </a:r>
           </a:p>
           <a:p>
@@ -23095,95 +22606,6 @@
               <a:buNone/>
             </a:pPr>
             <a:r>
-              <a:rPr lang="en-US">
-                <a:latin typeface="Consolas" panose="020B0609020204030204" pitchFamily="49" charset="0"/>
-              </a:rPr>
-              <a:t>{ a, b, </a:t>
-            </a:r>
-            <a:r>
-              <a:rPr lang="en-US">
-                <a:latin typeface="Consolas" panose="020B0609020204030204" pitchFamily="49" charset="0"/>
-              </a:rPr>
-              <a:t>c </a:t>
-            </a:r>
-            <a:r>
-              <a:rPr lang="en-US" smtClean="0">
-                <a:latin typeface="Consolas" panose="020B0609020204030204" pitchFamily="49" charset="0"/>
-              </a:rPr>
-              <a:t>} </a:t>
-            </a:r>
-            <a:r>
-              <a:rPr lang="ru-RU">
-                <a:latin typeface="Consolas" panose="020B0609020204030204" pitchFamily="49" charset="0"/>
-                <a:sym typeface="Symbol" panose="05050102010706020507" pitchFamily="18" charset="2"/>
-              </a:rPr>
-              <a:t></a:t>
-            </a:r>
-            <a:r>
-              <a:rPr lang="ru-RU">
-                <a:latin typeface="Consolas" panose="020B0609020204030204" pitchFamily="49" charset="0"/>
-              </a:rPr>
-              <a:t> </a:t>
-            </a:r>
-            <a:r>
-              <a:rPr lang="en-US">
-                <a:latin typeface="Consolas" panose="020B0609020204030204" pitchFamily="49" charset="0"/>
-              </a:rPr>
-              <a:t>(1, </a:t>
-            </a:r>
-            <a:r>
-              <a:rPr lang="en-US">
-                <a:latin typeface="Consolas" panose="020B0609020204030204" pitchFamily="49" charset="0"/>
-              </a:rPr>
-              <a:t>2</a:t>
-            </a:r>
-            <a:r>
-              <a:rPr lang="en-US" smtClean="0">
-                <a:latin typeface="Consolas" panose="020B0609020204030204" pitchFamily="49" charset="0"/>
-              </a:rPr>
-              <a:t>) * (2, 3) </a:t>
-            </a:r>
-            <a:r>
-              <a:rPr lang="ru-RU" smtClean="0">
-                <a:latin typeface="Consolas" panose="020B0609020204030204" pitchFamily="49" charset="0"/>
-                <a:sym typeface="Symbol" panose="05050102010706020507" pitchFamily="18" charset="2"/>
-              </a:rPr>
-              <a:t></a:t>
-            </a:r>
-            <a:r>
-              <a:rPr lang="en-US" smtClean="0">
-                <a:latin typeface="Consolas" panose="020B0609020204030204" pitchFamily="49" charset="0"/>
-                <a:sym typeface="Symbol" panose="05050102010706020507" pitchFamily="18" charset="2"/>
-              </a:rPr>
-              <a:t> </a:t>
-            </a:r>
-            <a:r>
-              <a:rPr lang="en-US">
-                <a:latin typeface="Consolas" panose="020B0609020204030204" pitchFamily="49" charset="0"/>
-                <a:sym typeface="Symbol" panose="05050102010706020507" pitchFamily="18" charset="2"/>
-              </a:rPr>
-              <a:t>{ b, c, </a:t>
-            </a:r>
-            <a:r>
-              <a:rPr lang="en-US">
-                <a:latin typeface="Consolas" panose="020B0609020204030204" pitchFamily="49" charset="0"/>
-                <a:sym typeface="Symbol" panose="05050102010706020507" pitchFamily="18" charset="2"/>
-              </a:rPr>
-              <a:t>a </a:t>
-            </a:r>
-            <a:r>
-              <a:rPr lang="en-US" smtClean="0">
-                <a:latin typeface="Consolas" panose="020B0609020204030204" pitchFamily="49" charset="0"/>
-                <a:sym typeface="Symbol" panose="05050102010706020507" pitchFamily="18" charset="2"/>
-              </a:rPr>
-              <a:t>}</a:t>
-            </a:r>
-          </a:p>
-          <a:p>
-            <a:pPr marL="45720" indent="0">
-              <a:buNone/>
-            </a:pPr>
-            <a:r>
               <a:rPr lang="en-US" smtClean="0">
                 <a:latin typeface="Consolas" panose="020B0609020204030204" pitchFamily="49" charset="0"/>
               </a:rPr>
@@ -23193,13 +22615,7 @@
               <a:rPr lang="en-US">
                 <a:latin typeface="Consolas" panose="020B0609020204030204" pitchFamily="49" charset="0"/>
               </a:rPr>
-              <a:t>1, 2) * (2, 3) </a:t>
-            </a:r>
-            <a:r>
-              <a:rPr lang="en-US">
-                <a:latin typeface="Consolas" panose="020B0609020204030204" pitchFamily="49" charset="0"/>
-              </a:rPr>
-              <a:t>== </a:t>
+              <a:t>1, 2) * (2, 3) == </a:t>
             </a:r>
             <a:r>
               <a:rPr lang="ru-RU" smtClean="0">
@@ -23249,13 +22665,7 @@
               <a:rPr lang="en-US">
                 <a:latin typeface="Consolas" panose="020B0609020204030204" pitchFamily="49" charset="0"/>
               </a:rPr>
-              <a:t>(1</a:t>
-            </a:r>
-            <a:r>
-              <a:rPr lang="en-US">
-                <a:latin typeface="Consolas" panose="020B0609020204030204" pitchFamily="49" charset="0"/>
-              </a:rPr>
-              <a:t>, </a:t>
+              <a:t>(1, </a:t>
             </a:r>
             <a:r>
               <a:rPr lang="en-US" smtClean="0">
@@ -23406,19 +22816,36 @@
               <a:rPr lang="en-US" sz="2000">
                 <a:latin typeface="Consolas" panose="020B0609020204030204" pitchFamily="49" charset="0"/>
               </a:rPr>
-              <a:t>template&lt;size_t I, size_t J, size_t... Is, typename </a:t>
+              <a:t>template&lt;size_t I, size_t J, size_t... Is, typename Tuple</a:t>
+            </a:r>
+            <a:r>
+              <a:rPr lang="en-US" sz="2000" smtClean="0">
+                <a:latin typeface="Consolas" panose="020B0609020204030204" pitchFamily="49" charset="0"/>
+              </a:rPr>
+              <a:t>&gt;</a:t>
+            </a:r>
+            <a:br>
+              <a:rPr lang="en-US" sz="2000" smtClean="0">
+                <a:latin typeface="Consolas" panose="020B0609020204030204" pitchFamily="49" charset="0"/>
+              </a:rPr>
+            </a:br>
+            <a:r>
+              <a:rPr lang="en-US" sz="2000" smtClean="0">
+                <a:latin typeface="Consolas" panose="020B0609020204030204" pitchFamily="49" charset="0"/>
+              </a:rPr>
+              <a:t>constexpr </a:t>
             </a:r>
             <a:r>
               <a:rPr lang="en-US" sz="2000">
                 <a:latin typeface="Consolas" panose="020B0609020204030204" pitchFamily="49" charset="0"/>
               </a:rPr>
-              <a:t>Tuple</a:t>
+              <a:t>auto permute_elts (Tuple &amp;&amp;t) </a:t>
             </a:r>
             <a:r>
               <a:rPr lang="en-US" sz="2000" smtClean="0">
                 <a:latin typeface="Consolas" panose="020B0609020204030204" pitchFamily="49" charset="0"/>
               </a:rPr>
-              <a:t>&gt;</a:t>
+              <a:t>{</a:t>
             </a:r>
             <a:br>
               <a:rPr lang="en-US" sz="2000" smtClean="0">
@@ -23429,48 +22856,13 @@
               <a:rPr lang="en-US" sz="2000" smtClean="0">
                 <a:latin typeface="Consolas" panose="020B0609020204030204" pitchFamily="49" charset="0"/>
               </a:rPr>
-              <a:t>constexpr </a:t>
+              <a:t>  </a:t>
             </a:r>
             <a:r>
               <a:rPr lang="en-US" sz="2000">
                 <a:latin typeface="Consolas" panose="020B0609020204030204" pitchFamily="49" charset="0"/>
               </a:rPr>
-              <a:t>auto permute_elts (Tuple &amp;&amp;t</a:t>
-            </a:r>
-            <a:r>
-              <a:rPr lang="en-US" sz="2000">
-                <a:latin typeface="Consolas" panose="020B0609020204030204" pitchFamily="49" charset="0"/>
-              </a:rPr>
-              <a:t>) </a:t>
-            </a:r>
-            <a:r>
-              <a:rPr lang="en-US" sz="2000" smtClean="0">
-                <a:latin typeface="Consolas" panose="020B0609020204030204" pitchFamily="49" charset="0"/>
-              </a:rPr>
-              <a:t>{</a:t>
-            </a:r>
-            <a:br>
-              <a:rPr lang="en-US" sz="2000" smtClean="0">
-                <a:latin typeface="Consolas" panose="020B0609020204030204" pitchFamily="49" charset="0"/>
-              </a:rPr>
-            </a:br>
-            <a:r>
-              <a:rPr lang="en-US" sz="2000" smtClean="0">
-                <a:latin typeface="Consolas" panose="020B0609020204030204" pitchFamily="49" charset="0"/>
-              </a:rPr>
-              <a:t>  </a:t>
-            </a:r>
-            <a:r>
-              <a:rPr lang="en-US" sz="2000">
-                <a:latin typeface="Consolas" panose="020B0609020204030204" pitchFamily="49" charset="0"/>
-              </a:rPr>
-              <a:t>if constexpr(sizeof...(Is) &gt; 0</a:t>
-            </a:r>
-            <a:r>
-              <a:rPr lang="en-US" sz="2000">
-                <a:latin typeface="Consolas" panose="020B0609020204030204" pitchFamily="49" charset="0"/>
-              </a:rPr>
-              <a:t>) </a:t>
+              <a:t>if constexpr(sizeof...(Is) &gt; 0) </a:t>
             </a:r>
             <a:r>
               <a:rPr lang="en-US" sz="2000" smtClean="0">
@@ -23502,16 +22894,7 @@
                 </a:solidFill>
                 <a:latin typeface="Consolas" panose="020B0609020204030204" pitchFamily="49" charset="0"/>
               </a:rPr>
-              <a:t>swap_elts&lt;I, J&gt;(forward&lt;Tuple&gt;(</a:t>
-            </a:r>
-            <a:r>
-              <a:rPr lang="en-US" sz="2000">
-                <a:solidFill>
-                  <a:srgbClr val="0000FF"/>
-                </a:solidFill>
-                <a:latin typeface="Consolas" panose="020B0609020204030204" pitchFamily="49" charset="0"/>
-              </a:rPr>
-              <a:t>t</a:t>
+              <a:t>swap_elts&lt;I, J&gt;(forward&lt;Tuple&gt;(t</a:t>
             </a:r>
             <a:r>
               <a:rPr lang="en-US" sz="2000" smtClean="0">
@@ -23565,13 +22948,7 @@
               <a:rPr lang="en-US" sz="2000">
                 <a:latin typeface="Consolas" panose="020B0609020204030204" pitchFamily="49" charset="0"/>
               </a:rPr>
-              <a:t>return swap_elts&lt;I, J&gt;(forward&lt;Tuple&gt;(</a:t>
-            </a:r>
-            <a:r>
-              <a:rPr lang="en-US" sz="2000">
-                <a:latin typeface="Consolas" panose="020B0609020204030204" pitchFamily="49" charset="0"/>
-              </a:rPr>
-              <a:t>t</a:t>
+              <a:t>return swap_elts&lt;I, J&gt;(forward&lt;Tuple&gt;(t</a:t>
             </a:r>
             <a:r>
               <a:rPr lang="en-US" sz="2000" smtClean="0">

</xml_diff>